<commit_message>
The full inheritance chart in chapter constructor
</commit_message>
<xml_diff>
--- a/utilities/Utilities.pptx
+++ b/utilities/Utilities.pptx
@@ -8,6 +8,7 @@
     <p:sldId id="256" r:id="rId2"/>
     <p:sldId id="257" r:id="rId3"/>
     <p:sldId id="258" r:id="rId4"/>
+    <p:sldId id="259" r:id="rId5"/>
   </p:sldIdLst>
   <p:sldSz cx="9144000" cy="6858000" type="screen4x3"/>
   <p:notesSz cx="6858000" cy="9144000"/>
@@ -290,7 +291,7 @@
           <a:p>
             <a:fld id="{B1E51262-F3D9-492B-90BF-8E4569FE00B5}" type="datetimeFigureOut">
               <a:rPr lang="zh-CN" altLang="en-US" smtClean="0"/>
-              <a:t>2016/9/5</a:t>
+              <a:t>2016/9/18</a:t>
             </a:fld>
             <a:endParaRPr lang="zh-CN" altLang="en-US"/>
           </a:p>
@@ -460,7 +461,7 @@
           <a:p>
             <a:fld id="{B1E51262-F3D9-492B-90BF-8E4569FE00B5}" type="datetimeFigureOut">
               <a:rPr lang="zh-CN" altLang="en-US" smtClean="0"/>
-              <a:t>2016/9/5</a:t>
+              <a:t>2016/9/18</a:t>
             </a:fld>
             <a:endParaRPr lang="zh-CN" altLang="en-US"/>
           </a:p>
@@ -640,7 +641,7 @@
           <a:p>
             <a:fld id="{B1E51262-F3D9-492B-90BF-8E4569FE00B5}" type="datetimeFigureOut">
               <a:rPr lang="zh-CN" altLang="en-US" smtClean="0"/>
-              <a:t>2016/9/5</a:t>
+              <a:t>2016/9/18</a:t>
             </a:fld>
             <a:endParaRPr lang="zh-CN" altLang="en-US"/>
           </a:p>
@@ -810,7 +811,7 @@
           <a:p>
             <a:fld id="{B1E51262-F3D9-492B-90BF-8E4569FE00B5}" type="datetimeFigureOut">
               <a:rPr lang="zh-CN" altLang="en-US" smtClean="0"/>
-              <a:t>2016/9/5</a:t>
+              <a:t>2016/9/18</a:t>
             </a:fld>
             <a:endParaRPr lang="zh-CN" altLang="en-US"/>
           </a:p>
@@ -1056,7 +1057,7 @@
           <a:p>
             <a:fld id="{B1E51262-F3D9-492B-90BF-8E4569FE00B5}" type="datetimeFigureOut">
               <a:rPr lang="zh-CN" altLang="en-US" smtClean="0"/>
-              <a:t>2016/9/5</a:t>
+              <a:t>2016/9/18</a:t>
             </a:fld>
             <a:endParaRPr lang="zh-CN" altLang="en-US"/>
           </a:p>
@@ -1344,7 +1345,7 @@
           <a:p>
             <a:fld id="{B1E51262-F3D9-492B-90BF-8E4569FE00B5}" type="datetimeFigureOut">
               <a:rPr lang="zh-CN" altLang="en-US" smtClean="0"/>
-              <a:t>2016/9/5</a:t>
+              <a:t>2016/9/18</a:t>
             </a:fld>
             <a:endParaRPr lang="zh-CN" altLang="en-US"/>
           </a:p>
@@ -1766,7 +1767,7 @@
           <a:p>
             <a:fld id="{B1E51262-F3D9-492B-90BF-8E4569FE00B5}" type="datetimeFigureOut">
               <a:rPr lang="zh-CN" altLang="en-US" smtClean="0"/>
-              <a:t>2016/9/5</a:t>
+              <a:t>2016/9/18</a:t>
             </a:fld>
             <a:endParaRPr lang="zh-CN" altLang="en-US"/>
           </a:p>
@@ -1884,7 +1885,7 @@
           <a:p>
             <a:fld id="{B1E51262-F3D9-492B-90BF-8E4569FE00B5}" type="datetimeFigureOut">
               <a:rPr lang="zh-CN" altLang="en-US" smtClean="0"/>
-              <a:t>2016/9/5</a:t>
+              <a:t>2016/9/18</a:t>
             </a:fld>
             <a:endParaRPr lang="zh-CN" altLang="en-US"/>
           </a:p>
@@ -1979,7 +1980,7 @@
           <a:p>
             <a:fld id="{B1E51262-F3D9-492B-90BF-8E4569FE00B5}" type="datetimeFigureOut">
               <a:rPr lang="zh-CN" altLang="en-US" smtClean="0"/>
-              <a:t>2016/9/5</a:t>
+              <a:t>2016/9/18</a:t>
             </a:fld>
             <a:endParaRPr lang="zh-CN" altLang="en-US"/>
           </a:p>
@@ -2256,7 +2257,7 @@
           <a:p>
             <a:fld id="{B1E51262-F3D9-492B-90BF-8E4569FE00B5}" type="datetimeFigureOut">
               <a:rPr lang="zh-CN" altLang="en-US" smtClean="0"/>
-              <a:t>2016/9/5</a:t>
+              <a:t>2016/9/18</a:t>
             </a:fld>
             <a:endParaRPr lang="zh-CN" altLang="en-US"/>
           </a:p>
@@ -2509,7 +2510,7 @@
           <a:p>
             <a:fld id="{B1E51262-F3D9-492B-90BF-8E4569FE00B5}" type="datetimeFigureOut">
               <a:rPr lang="zh-CN" altLang="en-US" smtClean="0"/>
-              <a:t>2016/9/5</a:t>
+              <a:t>2016/9/18</a:t>
             </a:fld>
             <a:endParaRPr lang="zh-CN" altLang="en-US"/>
           </a:p>
@@ -2722,7 +2723,7 @@
           <a:p>
             <a:fld id="{B1E51262-F3D9-492B-90BF-8E4569FE00B5}" type="datetimeFigureOut">
               <a:rPr lang="zh-CN" altLang="en-US" smtClean="0"/>
-              <a:t>2016/9/5</a:t>
+              <a:t>2016/9/18</a:t>
             </a:fld>
             <a:endParaRPr lang="zh-CN" altLang="en-US"/>
           </a:p>
@@ -4290,6 +4291,1857 @@
     <p:extLst>
       <p:ext uri="{BB962C8B-B14F-4D97-AF65-F5344CB8AC3E}">
         <p14:creationId xmlns:p14="http://schemas.microsoft.com/office/powerpoint/2010/main" val="602749365"/>
+      </p:ext>
+    </p:extLst>
+  </p:cSld>
+  <p:clrMapOvr>
+    <a:masterClrMapping/>
+  </p:clrMapOvr>
+</p:sld>
+</file>
+
+<file path=ppt/slides/slide4.xml><?xml version="1.0" encoding="utf-8"?>
+<p:sld xmlns:a="http://schemas.openxmlformats.org/drawingml/2006/main" xmlns:r="http://schemas.openxmlformats.org/officeDocument/2006/relationships" xmlns:p="http://schemas.openxmlformats.org/presentationml/2006/main">
+  <p:cSld>
+    <p:spTree>
+      <p:nvGrpSpPr>
+        <p:cNvPr id="1" name=""/>
+        <p:cNvGrpSpPr/>
+        <p:nvPr/>
+      </p:nvGrpSpPr>
+      <p:grpSpPr>
+        <a:xfrm>
+          <a:off x="0" y="0"/>
+          <a:ext cx="0" cy="0"/>
+          <a:chOff x="0" y="0"/>
+          <a:chExt cx="0" cy="0"/>
+        </a:xfrm>
+      </p:grpSpPr>
+      <p:graphicFrame>
+        <p:nvGraphicFramePr>
+          <p:cNvPr id="4" name="Table 3"/>
+          <p:cNvGraphicFramePr>
+            <a:graphicFrameLocks noGrp="1"/>
+          </p:cNvGraphicFramePr>
+          <p:nvPr>
+            <p:extLst>
+              <p:ext uri="{D42A27DB-BD31-4B8C-83A1-F6EECF244321}">
+                <p14:modId xmlns:p14="http://schemas.microsoft.com/office/powerpoint/2010/main" val="2059401359"/>
+              </p:ext>
+            </p:extLst>
+          </p:nvPr>
+        </p:nvGraphicFramePr>
+        <p:xfrm>
+          <a:off x="539552" y="1094854"/>
+          <a:ext cx="1872208" cy="1160659"/>
+        </p:xfrm>
+        <a:graphic>
+          <a:graphicData uri="http://schemas.openxmlformats.org/drawingml/2006/table">
+            <a:tbl>
+              <a:tblPr>
+                <a:effectLst>
+                  <a:outerShdw blurRad="50800" dist="38100" dir="2700000" algn="tl" rotWithShape="0">
+                    <a:prstClr val="black">
+                      <a:alpha val="40000"/>
+                    </a:prstClr>
+                  </a:outerShdw>
+                </a:effectLst>
+              </a:tblPr>
+              <a:tblGrid>
+                <a:gridCol w="955569"/>
+                <a:gridCol w="916639"/>
+              </a:tblGrid>
+              <a:tr h="253953">
+                <a:tc>
+                  <a:txBody>
+                    <a:bodyPr/>
+                    <a:lstStyle/>
+                    <a:p>
+                      <a:pPr algn="ctr"/>
+                      <a:r>
+                        <a:rPr lang="en-US" altLang="zh-CN" sz="1050" dirty="0" smtClean="0"/>
+                        <a:t>width</a:t>
+                      </a:r>
+                      <a:endParaRPr lang="zh-CN" altLang="en-US" sz="1050" dirty="0"/>
+                    </a:p>
+                  </a:txBody>
+                  <a:tcPr>
+                    <a:solidFill>
+                      <a:schemeClr val="accent3">
+                        <a:lumMod val="40000"/>
+                        <a:lumOff val="60000"/>
+                      </a:schemeClr>
+                    </a:solidFill>
+                  </a:tcPr>
+                </a:tc>
+                <a:tc>
+                  <a:txBody>
+                    <a:bodyPr/>
+                    <a:lstStyle/>
+                    <a:p>
+                      <a:pPr algn="ctr"/>
+                      <a:r>
+                        <a:rPr lang="en-US" altLang="zh-CN" sz="1050" dirty="0" smtClean="0"/>
+                        <a:t>5</a:t>
+                      </a:r>
+                      <a:endParaRPr lang="zh-CN" altLang="en-US" sz="1050" dirty="0"/>
+                    </a:p>
+                  </a:txBody>
+                  <a:tcPr>
+                    <a:solidFill>
+                      <a:schemeClr val="accent3">
+                        <a:lumMod val="40000"/>
+                        <a:lumOff val="60000"/>
+                      </a:schemeClr>
+                    </a:solidFill>
+                  </a:tcPr>
+                </a:tc>
+              </a:tr>
+              <a:tr h="253953">
+                <a:tc>
+                  <a:txBody>
+                    <a:bodyPr/>
+                    <a:lstStyle/>
+                    <a:p>
+                      <a:pPr algn="ctr"/>
+                      <a:r>
+                        <a:rPr lang="en-US" altLang="zh-CN" sz="1050" dirty="0" smtClean="0"/>
+                        <a:t>height</a:t>
+                      </a:r>
+                      <a:endParaRPr lang="zh-CN" altLang="en-US" sz="1050" dirty="0"/>
+                    </a:p>
+                  </a:txBody>
+                  <a:tcPr>
+                    <a:solidFill>
+                      <a:schemeClr val="accent3">
+                        <a:lumMod val="40000"/>
+                        <a:lumOff val="60000"/>
+                      </a:schemeClr>
+                    </a:solidFill>
+                  </a:tcPr>
+                </a:tc>
+                <a:tc>
+                  <a:txBody>
+                    <a:bodyPr/>
+                    <a:lstStyle/>
+                    <a:p>
+                      <a:pPr algn="ctr"/>
+                      <a:r>
+                        <a:rPr lang="en-US" altLang="zh-CN" sz="1050" dirty="0" smtClean="0"/>
+                        <a:t>7</a:t>
+                      </a:r>
+                      <a:endParaRPr lang="zh-CN" altLang="en-US" sz="1050" dirty="0"/>
+                    </a:p>
+                  </a:txBody>
+                  <a:tcPr>
+                    <a:solidFill>
+                      <a:schemeClr val="accent3">
+                        <a:lumMod val="40000"/>
+                        <a:lumOff val="60000"/>
+                      </a:schemeClr>
+                    </a:solidFill>
+                  </a:tcPr>
+                </a:tc>
+              </a:tr>
+              <a:tr h="398800">
+                <a:tc gridSpan="2">
+                  <a:txBody>
+                    <a:bodyPr/>
+                    <a:lstStyle/>
+                    <a:p>
+                      <a:pPr algn="ctr"/>
+                      <a:r>
+                        <a:rPr lang="en-US" altLang="zh-CN" sz="1200" dirty="0" err="1" smtClean="0"/>
+                        <a:t>rect</a:t>
+                      </a:r>
+                      <a:endParaRPr lang="zh-CN" altLang="en-US" sz="1050" dirty="0"/>
+                    </a:p>
+                  </a:txBody>
+                  <a:tcPr anchor="ctr">
+                    <a:solidFill>
+                      <a:schemeClr val="accent3"/>
+                    </a:solidFill>
+                  </a:tcPr>
+                </a:tc>
+                <a:tc hMerge="1">
+                  <a:txBody>
+                    <a:bodyPr/>
+                    <a:lstStyle/>
+                    <a:p>
+                      <a:endParaRPr lang="zh-CN" altLang="en-US" dirty="0"/>
+                    </a:p>
+                  </a:txBody>
+                  <a:tcPr/>
+                </a:tc>
+              </a:tr>
+              <a:tr h="253953">
+                <a:tc>
+                  <a:txBody>
+                    <a:bodyPr/>
+                    <a:lstStyle/>
+                    <a:p>
+                      <a:pPr algn="ctr"/>
+                      <a:r>
+                        <a:rPr lang="en-US" altLang="zh-CN" sz="1050" dirty="0" smtClean="0"/>
+                        <a:t>[[prototype]]</a:t>
+                      </a:r>
+                      <a:endParaRPr lang="zh-CN" altLang="en-US" sz="1050" dirty="0"/>
+                    </a:p>
+                  </a:txBody>
+                  <a:tcPr>
+                    <a:solidFill>
+                      <a:schemeClr val="bg1">
+                        <a:lumMod val="65000"/>
+                      </a:schemeClr>
+                    </a:solidFill>
+                  </a:tcPr>
+                </a:tc>
+                <a:tc>
+                  <a:txBody>
+                    <a:bodyPr/>
+                    <a:lstStyle/>
+                    <a:p>
+                      <a:pPr algn="ctr"/>
+                      <a:endParaRPr lang="zh-CN" altLang="en-US" sz="1050" dirty="0"/>
+                    </a:p>
+                  </a:txBody>
+                  <a:tcPr>
+                    <a:solidFill>
+                      <a:schemeClr val="bg1">
+                        <a:lumMod val="65000"/>
+                      </a:schemeClr>
+                    </a:solidFill>
+                  </a:tcPr>
+                </a:tc>
+              </a:tr>
+            </a:tbl>
+          </a:graphicData>
+        </a:graphic>
+      </p:graphicFrame>
+      <p:graphicFrame>
+        <p:nvGraphicFramePr>
+          <p:cNvPr id="11" name="Table 10"/>
+          <p:cNvGraphicFramePr>
+            <a:graphicFrameLocks noGrp="1"/>
+          </p:cNvGraphicFramePr>
+          <p:nvPr>
+            <p:extLst>
+              <p:ext uri="{D42A27DB-BD31-4B8C-83A1-F6EECF244321}">
+                <p14:modId xmlns:p14="http://schemas.microsoft.com/office/powerpoint/2010/main" val="2147571540"/>
+              </p:ext>
+            </p:extLst>
+          </p:nvPr>
+        </p:nvGraphicFramePr>
+        <p:xfrm>
+          <a:off x="2899544" y="2906121"/>
+          <a:ext cx="1872208" cy="1142763"/>
+        </p:xfrm>
+        <a:graphic>
+          <a:graphicData uri="http://schemas.openxmlformats.org/drawingml/2006/table">
+            <a:tbl>
+              <a:tblPr>
+                <a:effectLst>
+                  <a:outerShdw blurRad="50800" dist="38100" dir="2700000" algn="tl" rotWithShape="0">
+                    <a:prstClr val="black">
+                      <a:alpha val="40000"/>
+                    </a:prstClr>
+                  </a:outerShdw>
+                </a:effectLst>
+              </a:tblPr>
+              <a:tblGrid>
+                <a:gridCol w="955569"/>
+                <a:gridCol w="916639"/>
+              </a:tblGrid>
+              <a:tr h="253953">
+                <a:tc gridSpan="2">
+                  <a:txBody>
+                    <a:bodyPr/>
+                    <a:lstStyle/>
+                    <a:p>
+                      <a:pPr algn="ctr"/>
+                      <a:r>
+                        <a:rPr lang="en-US" altLang="zh-CN" sz="1050" dirty="0" smtClean="0"/>
+                        <a:t>other properties</a:t>
+                      </a:r>
+                      <a:endParaRPr lang="zh-CN" altLang="en-US" sz="1050" dirty="0"/>
+                    </a:p>
+                  </a:txBody>
+                  <a:tcPr>
+                    <a:solidFill>
+                      <a:schemeClr val="accent1">
+                        <a:lumMod val="40000"/>
+                        <a:lumOff val="60000"/>
+                      </a:schemeClr>
+                    </a:solidFill>
+                  </a:tcPr>
+                </a:tc>
+                <a:tc hMerge="1">
+                  <a:txBody>
+                    <a:bodyPr/>
+                    <a:lstStyle/>
+                    <a:p>
+                      <a:pPr algn="ctr"/>
+                      <a:endParaRPr lang="zh-CN" altLang="en-US" sz="1050" dirty="0"/>
+                    </a:p>
+                  </a:txBody>
+                  <a:tcPr>
+                    <a:solidFill>
+                      <a:schemeClr val="accent3">
+                        <a:lumMod val="40000"/>
+                        <a:lumOff val="60000"/>
+                      </a:schemeClr>
+                    </a:solidFill>
+                  </a:tcPr>
+                </a:tc>
+              </a:tr>
+              <a:tr h="253953">
+                <a:tc>
+                  <a:txBody>
+                    <a:bodyPr/>
+                    <a:lstStyle/>
+                    <a:p>
+                      <a:pPr algn="ctr"/>
+                      <a:r>
+                        <a:rPr lang="en-US" altLang="zh-CN" sz="1050" dirty="0" smtClean="0">
+                          <a:solidFill>
+                            <a:schemeClr val="accent2"/>
+                          </a:solidFill>
+                        </a:rPr>
+                        <a:t>prototype</a:t>
+                      </a:r>
+                      <a:endParaRPr lang="zh-CN" altLang="en-US" sz="1050" dirty="0">
+                        <a:solidFill>
+                          <a:schemeClr val="accent2"/>
+                        </a:solidFill>
+                      </a:endParaRPr>
+                    </a:p>
+                  </a:txBody>
+                  <a:tcPr>
+                    <a:solidFill>
+                      <a:schemeClr val="accent1">
+                        <a:lumMod val="40000"/>
+                        <a:lumOff val="60000"/>
+                      </a:schemeClr>
+                    </a:solidFill>
+                  </a:tcPr>
+                </a:tc>
+                <a:tc>
+                  <a:txBody>
+                    <a:bodyPr/>
+                    <a:lstStyle/>
+                    <a:p>
+                      <a:pPr algn="ctr"/>
+                      <a:r>
+                        <a:rPr lang="en-US" altLang="zh-CN" sz="1050" dirty="0" smtClean="0"/>
+                        <a:t>[object]</a:t>
+                      </a:r>
+                      <a:endParaRPr lang="zh-CN" altLang="en-US" sz="1050" dirty="0"/>
+                    </a:p>
+                  </a:txBody>
+                  <a:tcPr>
+                    <a:solidFill>
+                      <a:schemeClr val="accent1">
+                        <a:lumMod val="40000"/>
+                        <a:lumOff val="60000"/>
+                      </a:schemeClr>
+                    </a:solidFill>
+                  </a:tcPr>
+                </a:tc>
+              </a:tr>
+              <a:tr h="380904">
+                <a:tc gridSpan="2">
+                  <a:txBody>
+                    <a:bodyPr/>
+                    <a:lstStyle/>
+                    <a:p>
+                      <a:pPr algn="ctr"/>
+                      <a:r>
+                        <a:rPr lang="en-US" altLang="zh-CN" sz="1200" dirty="0" smtClean="0"/>
+                        <a:t>Rectangle</a:t>
+                      </a:r>
+                      <a:endParaRPr lang="zh-CN" altLang="en-US" sz="1050" dirty="0"/>
+                    </a:p>
+                  </a:txBody>
+                  <a:tcPr anchor="ctr">
+                    <a:solidFill>
+                      <a:srgbClr val="00B0F0"/>
+                    </a:solidFill>
+                  </a:tcPr>
+                </a:tc>
+                <a:tc hMerge="1">
+                  <a:txBody>
+                    <a:bodyPr/>
+                    <a:lstStyle/>
+                    <a:p>
+                      <a:endParaRPr lang="zh-CN" altLang="en-US" dirty="0"/>
+                    </a:p>
+                  </a:txBody>
+                  <a:tcPr/>
+                </a:tc>
+              </a:tr>
+              <a:tr h="253953">
+                <a:tc>
+                  <a:txBody>
+                    <a:bodyPr/>
+                    <a:lstStyle/>
+                    <a:p>
+                      <a:pPr algn="ctr"/>
+                      <a:r>
+                        <a:rPr lang="en-US" altLang="zh-CN" sz="1050" dirty="0" smtClean="0"/>
+                        <a:t>[[prototype]]</a:t>
+                      </a:r>
+                      <a:endParaRPr lang="zh-CN" altLang="en-US" sz="1050" dirty="0"/>
+                    </a:p>
+                  </a:txBody>
+                  <a:tcPr>
+                    <a:solidFill>
+                      <a:schemeClr val="bg1">
+                        <a:lumMod val="65000"/>
+                      </a:schemeClr>
+                    </a:solidFill>
+                  </a:tcPr>
+                </a:tc>
+                <a:tc>
+                  <a:txBody>
+                    <a:bodyPr/>
+                    <a:lstStyle/>
+                    <a:p>
+                      <a:pPr algn="ctr"/>
+                      <a:endParaRPr lang="zh-CN" altLang="en-US" sz="1050" dirty="0"/>
+                    </a:p>
+                  </a:txBody>
+                  <a:tcPr>
+                    <a:solidFill>
+                      <a:schemeClr val="bg1">
+                        <a:lumMod val="65000"/>
+                      </a:schemeClr>
+                    </a:solidFill>
+                  </a:tcPr>
+                </a:tc>
+              </a:tr>
+            </a:tbl>
+          </a:graphicData>
+        </a:graphic>
+      </p:graphicFrame>
+      <p:graphicFrame>
+        <p:nvGraphicFramePr>
+          <p:cNvPr id="12" name="Table 11"/>
+          <p:cNvGraphicFramePr>
+            <a:graphicFrameLocks noGrp="1"/>
+          </p:cNvGraphicFramePr>
+          <p:nvPr>
+            <p:extLst>
+              <p:ext uri="{D42A27DB-BD31-4B8C-83A1-F6EECF244321}">
+                <p14:modId xmlns:p14="http://schemas.microsoft.com/office/powerpoint/2010/main" val="4244082876"/>
+              </p:ext>
+            </p:extLst>
+          </p:nvPr>
+        </p:nvGraphicFramePr>
+        <p:xfrm>
+          <a:off x="5588350" y="3282637"/>
+          <a:ext cx="1872208" cy="1159439"/>
+        </p:xfrm>
+        <a:graphic>
+          <a:graphicData uri="http://schemas.openxmlformats.org/drawingml/2006/table">
+            <a:tbl>
+              <a:tblPr>
+                <a:effectLst>
+                  <a:outerShdw blurRad="50800" dist="38100" dir="2700000" algn="tl" rotWithShape="0">
+                    <a:prstClr val="black">
+                      <a:alpha val="40000"/>
+                    </a:prstClr>
+                  </a:outerShdw>
+                </a:effectLst>
+              </a:tblPr>
+              <a:tblGrid>
+                <a:gridCol w="955569"/>
+                <a:gridCol w="916639"/>
+              </a:tblGrid>
+              <a:tr h="253953">
+                <a:tc gridSpan="2">
+                  <a:txBody>
+                    <a:bodyPr/>
+                    <a:lstStyle/>
+                    <a:p>
+                      <a:pPr algn="ctr"/>
+                      <a:r>
+                        <a:rPr lang="en-US" altLang="zh-CN" sz="1050" dirty="0" smtClean="0"/>
+                        <a:t>other properties</a:t>
+                      </a:r>
+                      <a:endParaRPr lang="zh-CN" altLang="en-US" sz="1050" dirty="0"/>
+                    </a:p>
+                  </a:txBody>
+                  <a:tcPr>
+                    <a:solidFill>
+                      <a:schemeClr val="accent4">
+                        <a:lumMod val="40000"/>
+                        <a:lumOff val="60000"/>
+                      </a:schemeClr>
+                    </a:solidFill>
+                  </a:tcPr>
+                </a:tc>
+                <a:tc hMerge="1">
+                  <a:txBody>
+                    <a:bodyPr/>
+                    <a:lstStyle/>
+                    <a:p>
+                      <a:pPr algn="ctr"/>
+                      <a:endParaRPr lang="zh-CN" altLang="en-US" sz="1050" dirty="0"/>
+                    </a:p>
+                  </a:txBody>
+                  <a:tcPr>
+                    <a:solidFill>
+                      <a:schemeClr val="accent3">
+                        <a:lumMod val="40000"/>
+                        <a:lumOff val="60000"/>
+                      </a:schemeClr>
+                    </a:solidFill>
+                  </a:tcPr>
+                </a:tc>
+              </a:tr>
+              <a:tr h="253953">
+                <a:tc>
+                  <a:txBody>
+                    <a:bodyPr/>
+                    <a:lstStyle/>
+                    <a:p>
+                      <a:pPr algn="ctr"/>
+                      <a:r>
+                        <a:rPr lang="en-US" altLang="zh-CN" sz="1050" dirty="0" smtClean="0">
+                          <a:solidFill>
+                            <a:schemeClr val="accent2"/>
+                          </a:solidFill>
+                        </a:rPr>
+                        <a:t>prototype</a:t>
+                      </a:r>
+                      <a:endParaRPr lang="zh-CN" altLang="en-US" sz="1050" dirty="0">
+                        <a:solidFill>
+                          <a:schemeClr val="accent2"/>
+                        </a:solidFill>
+                      </a:endParaRPr>
+                    </a:p>
+                  </a:txBody>
+                  <a:tcPr>
+                    <a:solidFill>
+                      <a:schemeClr val="accent4">
+                        <a:lumMod val="40000"/>
+                        <a:lumOff val="60000"/>
+                      </a:schemeClr>
+                    </a:solidFill>
+                  </a:tcPr>
+                </a:tc>
+                <a:tc>
+                  <a:txBody>
+                    <a:bodyPr/>
+                    <a:lstStyle/>
+                    <a:p>
+                      <a:pPr algn="ctr"/>
+                      <a:r>
+                        <a:rPr lang="en-US" altLang="zh-CN" sz="1050" dirty="0" smtClean="0"/>
+                        <a:t>[object]</a:t>
+                      </a:r>
+                      <a:endParaRPr lang="zh-CN" altLang="en-US" sz="1050" dirty="0"/>
+                    </a:p>
+                  </a:txBody>
+                  <a:tcPr>
+                    <a:solidFill>
+                      <a:schemeClr val="accent4">
+                        <a:lumMod val="40000"/>
+                        <a:lumOff val="60000"/>
+                      </a:schemeClr>
+                    </a:solidFill>
+                  </a:tcPr>
+                </a:tc>
+              </a:tr>
+              <a:tr h="397580">
+                <a:tc gridSpan="2">
+                  <a:txBody>
+                    <a:bodyPr/>
+                    <a:lstStyle/>
+                    <a:p>
+                      <a:pPr algn="ctr"/>
+                      <a:r>
+                        <a:rPr lang="en-US" altLang="zh-CN" sz="1200" dirty="0" smtClean="0"/>
+                        <a:t>Function.prototype</a:t>
+                      </a:r>
+                      <a:endParaRPr lang="zh-CN" altLang="en-US" sz="1050" dirty="0"/>
+                    </a:p>
+                  </a:txBody>
+                  <a:tcPr anchor="ctr">
+                    <a:solidFill>
+                      <a:schemeClr val="accent4"/>
+                    </a:solidFill>
+                  </a:tcPr>
+                </a:tc>
+                <a:tc hMerge="1">
+                  <a:txBody>
+                    <a:bodyPr/>
+                    <a:lstStyle/>
+                    <a:p>
+                      <a:endParaRPr lang="zh-CN" altLang="en-US" dirty="0"/>
+                    </a:p>
+                  </a:txBody>
+                  <a:tcPr/>
+                </a:tc>
+              </a:tr>
+              <a:tr h="253953">
+                <a:tc>
+                  <a:txBody>
+                    <a:bodyPr/>
+                    <a:lstStyle/>
+                    <a:p>
+                      <a:pPr algn="ctr"/>
+                      <a:r>
+                        <a:rPr lang="en-US" altLang="zh-CN" sz="1050" dirty="0" smtClean="0"/>
+                        <a:t>[[prototype]]</a:t>
+                      </a:r>
+                      <a:endParaRPr lang="zh-CN" altLang="en-US" sz="1050" dirty="0"/>
+                    </a:p>
+                  </a:txBody>
+                  <a:tcPr>
+                    <a:solidFill>
+                      <a:schemeClr val="bg1">
+                        <a:lumMod val="65000"/>
+                      </a:schemeClr>
+                    </a:solidFill>
+                  </a:tcPr>
+                </a:tc>
+                <a:tc>
+                  <a:txBody>
+                    <a:bodyPr/>
+                    <a:lstStyle/>
+                    <a:p>
+                      <a:pPr algn="ctr"/>
+                      <a:endParaRPr lang="zh-CN" altLang="en-US" sz="1050" dirty="0"/>
+                    </a:p>
+                  </a:txBody>
+                  <a:tcPr>
+                    <a:solidFill>
+                      <a:schemeClr val="bg1">
+                        <a:lumMod val="65000"/>
+                      </a:schemeClr>
+                    </a:solidFill>
+                  </a:tcPr>
+                </a:tc>
+              </a:tr>
+            </a:tbl>
+          </a:graphicData>
+        </a:graphic>
+      </p:graphicFrame>
+      <p:cxnSp>
+        <p:nvCxnSpPr>
+          <p:cNvPr id="14" name="Straight Connector 13"/>
+          <p:cNvCxnSpPr/>
+          <p:nvPr/>
+        </p:nvCxnSpPr>
+        <p:spPr>
+          <a:xfrm>
+            <a:off x="1891432" y="2118003"/>
+            <a:ext cx="1008112" cy="0"/>
+          </a:xfrm>
+          <a:prstGeom prst="line">
+            <a:avLst/>
+          </a:prstGeom>
+          <a:ln w="12700">
+            <a:headEnd type="oval"/>
+            <a:tailEnd type="stealth" w="lg" len="lg"/>
+          </a:ln>
+        </p:spPr>
+        <p:style>
+          <a:lnRef idx="1">
+            <a:schemeClr val="accent1"/>
+          </a:lnRef>
+          <a:fillRef idx="0">
+            <a:schemeClr val="accent1"/>
+          </a:fillRef>
+          <a:effectRef idx="0">
+            <a:schemeClr val="accent1"/>
+          </a:effectRef>
+          <a:fontRef idx="minor">
+            <a:schemeClr val="tx1"/>
+          </a:fontRef>
+        </p:style>
+      </p:cxnSp>
+      <p:graphicFrame>
+        <p:nvGraphicFramePr>
+          <p:cNvPr id="13" name="Table 12"/>
+          <p:cNvGraphicFramePr>
+            <a:graphicFrameLocks noGrp="1"/>
+          </p:cNvGraphicFramePr>
+          <p:nvPr>
+            <p:extLst>
+              <p:ext uri="{D42A27DB-BD31-4B8C-83A1-F6EECF244321}">
+                <p14:modId xmlns:p14="http://schemas.microsoft.com/office/powerpoint/2010/main" val="281328353"/>
+              </p:ext>
+            </p:extLst>
+          </p:nvPr>
+        </p:nvGraphicFramePr>
+        <p:xfrm>
+          <a:off x="2899544" y="1406161"/>
+          <a:ext cx="1872208" cy="1142763"/>
+        </p:xfrm>
+        <a:graphic>
+          <a:graphicData uri="http://schemas.openxmlformats.org/drawingml/2006/table">
+            <a:tbl>
+              <a:tblPr>
+                <a:effectLst>
+                  <a:outerShdw blurRad="50800" dist="38100" dir="2700000" algn="tl" rotWithShape="0">
+                    <a:prstClr val="black">
+                      <a:alpha val="40000"/>
+                    </a:prstClr>
+                  </a:outerShdw>
+                </a:effectLst>
+              </a:tblPr>
+              <a:tblGrid>
+                <a:gridCol w="955569"/>
+                <a:gridCol w="916639"/>
+              </a:tblGrid>
+              <a:tr h="253953">
+                <a:tc>
+                  <a:txBody>
+                    <a:bodyPr/>
+                    <a:lstStyle/>
+                    <a:p>
+                      <a:pPr algn="ctr"/>
+                      <a:r>
+                        <a:rPr lang="en-US" altLang="zh-CN" sz="1050" dirty="0" smtClean="0"/>
+                        <a:t>constructor</a:t>
+                      </a:r>
+                      <a:endParaRPr lang="zh-CN" altLang="en-US" sz="1050" dirty="0"/>
+                    </a:p>
+                  </a:txBody>
+                  <a:tcPr>
+                    <a:solidFill>
+                      <a:schemeClr val="accent1">
+                        <a:lumMod val="40000"/>
+                        <a:lumOff val="60000"/>
+                      </a:schemeClr>
+                    </a:solidFill>
+                  </a:tcPr>
+                </a:tc>
+                <a:tc>
+                  <a:txBody>
+                    <a:bodyPr/>
+                    <a:lstStyle/>
+                    <a:p>
+                      <a:pPr algn="ctr"/>
+                      <a:r>
+                        <a:rPr lang="en-US" altLang="zh-CN" sz="1050" dirty="0" smtClean="0"/>
+                        <a:t>[object]</a:t>
+                      </a:r>
+                      <a:endParaRPr lang="zh-CN" altLang="en-US" sz="1050" dirty="0"/>
+                    </a:p>
+                  </a:txBody>
+                  <a:tcPr>
+                    <a:solidFill>
+                      <a:schemeClr val="accent1">
+                        <a:lumMod val="40000"/>
+                        <a:lumOff val="60000"/>
+                      </a:schemeClr>
+                    </a:solidFill>
+                  </a:tcPr>
+                </a:tc>
+              </a:tr>
+              <a:tr h="253953">
+                <a:tc>
+                  <a:txBody>
+                    <a:bodyPr/>
+                    <a:lstStyle/>
+                    <a:p>
+                      <a:pPr algn="ctr"/>
+                      <a:r>
+                        <a:rPr lang="en-US" altLang="zh-CN" sz="1050" dirty="0" smtClean="0"/>
+                        <a:t>getArea</a:t>
+                      </a:r>
+                      <a:endParaRPr lang="zh-CN" altLang="en-US" sz="1050" dirty="0"/>
+                    </a:p>
+                  </a:txBody>
+                  <a:tcPr>
+                    <a:solidFill>
+                      <a:schemeClr val="accent1">
+                        <a:lumMod val="40000"/>
+                        <a:lumOff val="60000"/>
+                      </a:schemeClr>
+                    </a:solidFill>
+                  </a:tcPr>
+                </a:tc>
+                <a:tc>
+                  <a:txBody>
+                    <a:bodyPr/>
+                    <a:lstStyle/>
+                    <a:p>
+                      <a:pPr algn="ctr"/>
+                      <a:r>
+                        <a:rPr lang="en-US" altLang="zh-CN" sz="1050" dirty="0" smtClean="0"/>
+                        <a:t>[function]</a:t>
+                      </a:r>
+                      <a:endParaRPr lang="zh-CN" altLang="en-US" sz="1050" dirty="0"/>
+                    </a:p>
+                  </a:txBody>
+                  <a:tcPr>
+                    <a:solidFill>
+                      <a:schemeClr val="accent1">
+                        <a:lumMod val="40000"/>
+                        <a:lumOff val="60000"/>
+                      </a:schemeClr>
+                    </a:solidFill>
+                  </a:tcPr>
+                </a:tc>
+              </a:tr>
+              <a:tr h="380904">
+                <a:tc gridSpan="2">
+                  <a:txBody>
+                    <a:bodyPr/>
+                    <a:lstStyle/>
+                    <a:p>
+                      <a:pPr algn="ctr"/>
+                      <a:r>
+                        <a:rPr lang="en-US" altLang="zh-CN" sz="1200" dirty="0" smtClean="0"/>
+                        <a:t>Rectangle.prototype</a:t>
+                      </a:r>
+                      <a:endParaRPr lang="zh-CN" altLang="en-US" sz="1050" dirty="0"/>
+                    </a:p>
+                  </a:txBody>
+                  <a:tcPr anchor="ctr">
+                    <a:solidFill>
+                      <a:srgbClr val="00B0F0"/>
+                    </a:solidFill>
+                  </a:tcPr>
+                </a:tc>
+                <a:tc hMerge="1">
+                  <a:txBody>
+                    <a:bodyPr/>
+                    <a:lstStyle/>
+                    <a:p>
+                      <a:endParaRPr lang="zh-CN" altLang="en-US" dirty="0"/>
+                    </a:p>
+                  </a:txBody>
+                  <a:tcPr/>
+                </a:tc>
+              </a:tr>
+              <a:tr h="253953">
+                <a:tc>
+                  <a:txBody>
+                    <a:bodyPr/>
+                    <a:lstStyle/>
+                    <a:p>
+                      <a:pPr algn="ctr"/>
+                      <a:r>
+                        <a:rPr lang="en-US" altLang="zh-CN" sz="1050" dirty="0" smtClean="0"/>
+                        <a:t>[[prototype]]</a:t>
+                      </a:r>
+                      <a:endParaRPr lang="zh-CN" altLang="en-US" sz="1050" dirty="0"/>
+                    </a:p>
+                  </a:txBody>
+                  <a:tcPr>
+                    <a:solidFill>
+                      <a:schemeClr val="bg1">
+                        <a:lumMod val="65000"/>
+                      </a:schemeClr>
+                    </a:solidFill>
+                  </a:tcPr>
+                </a:tc>
+                <a:tc>
+                  <a:txBody>
+                    <a:bodyPr/>
+                    <a:lstStyle/>
+                    <a:p>
+                      <a:pPr algn="ctr"/>
+                      <a:endParaRPr lang="zh-CN" altLang="en-US" sz="1050" dirty="0"/>
+                    </a:p>
+                  </a:txBody>
+                  <a:tcPr>
+                    <a:solidFill>
+                      <a:schemeClr val="bg1">
+                        <a:lumMod val="65000"/>
+                      </a:schemeClr>
+                    </a:solidFill>
+                  </a:tcPr>
+                </a:tc>
+              </a:tr>
+            </a:tbl>
+          </a:graphicData>
+        </a:graphic>
+      </p:graphicFrame>
+      <p:cxnSp>
+        <p:nvCxnSpPr>
+          <p:cNvPr id="7" name="Straight Connector 6"/>
+          <p:cNvCxnSpPr/>
+          <p:nvPr/>
+        </p:nvCxnSpPr>
+        <p:spPr>
+          <a:xfrm>
+            <a:off x="4606998" y="3282637"/>
+            <a:ext cx="432048" cy="0"/>
+          </a:xfrm>
+          <a:prstGeom prst="line">
+            <a:avLst/>
+          </a:prstGeom>
+          <a:ln w="12700">
+            <a:prstDash val="dash"/>
+            <a:headEnd type="oval"/>
+          </a:ln>
+        </p:spPr>
+        <p:style>
+          <a:lnRef idx="1">
+            <a:schemeClr val="accent1"/>
+          </a:lnRef>
+          <a:fillRef idx="0">
+            <a:schemeClr val="accent1"/>
+          </a:fillRef>
+          <a:effectRef idx="0">
+            <a:schemeClr val="accent1"/>
+          </a:effectRef>
+          <a:fontRef idx="minor">
+            <a:schemeClr val="tx1"/>
+          </a:fontRef>
+        </p:style>
+      </p:cxnSp>
+      <p:cxnSp>
+        <p:nvCxnSpPr>
+          <p:cNvPr id="15" name="Elbow Connector 14"/>
+          <p:cNvCxnSpPr/>
+          <p:nvPr/>
+        </p:nvCxnSpPr>
+        <p:spPr>
+          <a:xfrm rot="16200000" flipV="1">
+            <a:off x="4322875" y="2566465"/>
+            <a:ext cx="1165050" cy="267295"/>
+          </a:xfrm>
+          <a:prstGeom prst="bentConnector2">
+            <a:avLst/>
+          </a:prstGeom>
+          <a:ln w="12700">
+            <a:prstDash val="dash"/>
+            <a:headEnd type="none" w="lg" len="lg"/>
+            <a:tailEnd type="stealth" w="lg" len="lg"/>
+          </a:ln>
+        </p:spPr>
+        <p:style>
+          <a:lnRef idx="1">
+            <a:schemeClr val="accent1"/>
+          </a:lnRef>
+          <a:fillRef idx="0">
+            <a:schemeClr val="accent1"/>
+          </a:fillRef>
+          <a:effectRef idx="0">
+            <a:schemeClr val="accent1"/>
+          </a:effectRef>
+          <a:fontRef idx="minor">
+            <a:schemeClr val="tx1"/>
+          </a:fontRef>
+        </p:style>
+      </p:cxnSp>
+      <p:cxnSp>
+        <p:nvCxnSpPr>
+          <p:cNvPr id="21" name="Straight Connector 20"/>
+          <p:cNvCxnSpPr/>
+          <p:nvPr/>
+        </p:nvCxnSpPr>
+        <p:spPr>
+          <a:xfrm>
+            <a:off x="4639280" y="1541939"/>
+            <a:ext cx="652800" cy="0"/>
+          </a:xfrm>
+          <a:prstGeom prst="line">
+            <a:avLst/>
+          </a:prstGeom>
+          <a:ln w="12700">
+            <a:prstDash val="dash"/>
+            <a:headEnd type="oval"/>
+          </a:ln>
+        </p:spPr>
+        <p:style>
+          <a:lnRef idx="1">
+            <a:schemeClr val="accent1"/>
+          </a:lnRef>
+          <a:fillRef idx="0">
+            <a:schemeClr val="accent1"/>
+          </a:fillRef>
+          <a:effectRef idx="0">
+            <a:schemeClr val="accent1"/>
+          </a:effectRef>
+          <a:fontRef idx="minor">
+            <a:schemeClr val="tx1"/>
+          </a:fontRef>
+        </p:style>
+      </p:cxnSp>
+      <p:cxnSp>
+        <p:nvCxnSpPr>
+          <p:cNvPr id="22" name="Elbow Connector 21"/>
+          <p:cNvCxnSpPr/>
+          <p:nvPr/>
+        </p:nvCxnSpPr>
+        <p:spPr>
+          <a:xfrm rot="10800000">
+            <a:off x="4804120" y="3630176"/>
+            <a:ext cx="487961" cy="3"/>
+          </a:xfrm>
+          <a:prstGeom prst="bentConnector3">
+            <a:avLst>
+              <a:gd name="adj1" fmla="val 50000"/>
+            </a:avLst>
+          </a:prstGeom>
+          <a:ln w="12700">
+            <a:prstDash val="dash"/>
+            <a:headEnd type="none" w="lg" len="lg"/>
+            <a:tailEnd type="stealth" w="lg" len="lg"/>
+          </a:ln>
+        </p:spPr>
+        <p:style>
+          <a:lnRef idx="1">
+            <a:schemeClr val="accent1"/>
+          </a:lnRef>
+          <a:fillRef idx="0">
+            <a:schemeClr val="accent1"/>
+          </a:fillRef>
+          <a:effectRef idx="0">
+            <a:schemeClr val="accent1"/>
+          </a:effectRef>
+          <a:fontRef idx="minor">
+            <a:schemeClr val="tx1"/>
+          </a:fontRef>
+        </p:style>
+      </p:cxnSp>
+      <p:cxnSp>
+        <p:nvCxnSpPr>
+          <p:cNvPr id="28" name="Straight Connector 27"/>
+          <p:cNvCxnSpPr/>
+          <p:nvPr/>
+        </p:nvCxnSpPr>
+        <p:spPr>
+          <a:xfrm flipV="1">
+            <a:off x="5292080" y="1541940"/>
+            <a:ext cx="0" cy="2088230"/>
+          </a:xfrm>
+          <a:prstGeom prst="line">
+            <a:avLst/>
+          </a:prstGeom>
+          <a:ln w="12700">
+            <a:prstDash val="dash"/>
+          </a:ln>
+        </p:spPr>
+        <p:style>
+          <a:lnRef idx="1">
+            <a:schemeClr val="accent1"/>
+          </a:lnRef>
+          <a:fillRef idx="0">
+            <a:schemeClr val="accent1"/>
+          </a:fillRef>
+          <a:effectRef idx="0">
+            <a:schemeClr val="accent1"/>
+          </a:effectRef>
+          <a:fontRef idx="minor">
+            <a:schemeClr val="tx1"/>
+          </a:fontRef>
+        </p:style>
+      </p:cxnSp>
+      <p:cxnSp>
+        <p:nvCxnSpPr>
+          <p:cNvPr id="6" name="Elbow Connector 5"/>
+          <p:cNvCxnSpPr>
+            <a:endCxn id="36" idx="1"/>
+          </p:cNvCxnSpPr>
+          <p:nvPr/>
+        </p:nvCxnSpPr>
+        <p:spPr>
+          <a:xfrm flipV="1">
+            <a:off x="4499992" y="1488439"/>
+            <a:ext cx="1597814" cy="923700"/>
+          </a:xfrm>
+          <a:prstGeom prst="bentConnector3">
+            <a:avLst>
+              <a:gd name="adj1" fmla="val 71654"/>
+            </a:avLst>
+          </a:prstGeom>
+          <a:ln w="12700">
+            <a:headEnd type="oval" w="med" len="med"/>
+            <a:tailEnd type="stealth" w="lg" len="lg"/>
+          </a:ln>
+        </p:spPr>
+        <p:style>
+          <a:lnRef idx="1">
+            <a:schemeClr val="accent1"/>
+          </a:lnRef>
+          <a:fillRef idx="0">
+            <a:schemeClr val="accent1"/>
+          </a:fillRef>
+          <a:effectRef idx="0">
+            <a:schemeClr val="accent1"/>
+          </a:effectRef>
+          <a:fontRef idx="minor">
+            <a:schemeClr val="tx1"/>
+          </a:fontRef>
+        </p:style>
+      </p:cxnSp>
+      <p:graphicFrame>
+        <p:nvGraphicFramePr>
+          <p:cNvPr id="35" name="Table 34"/>
+          <p:cNvGraphicFramePr>
+            <a:graphicFrameLocks noGrp="1"/>
+          </p:cNvGraphicFramePr>
+          <p:nvPr>
+            <p:extLst>
+              <p:ext uri="{D42A27DB-BD31-4B8C-83A1-F6EECF244321}">
+                <p14:modId xmlns:p14="http://schemas.microsoft.com/office/powerpoint/2010/main" val="3798901532"/>
+              </p:ext>
+            </p:extLst>
+          </p:nvPr>
+        </p:nvGraphicFramePr>
+        <p:xfrm>
+          <a:off x="5609091" y="4941168"/>
+          <a:ext cx="1872208" cy="1159439"/>
+        </p:xfrm>
+        <a:graphic>
+          <a:graphicData uri="http://schemas.openxmlformats.org/drawingml/2006/table">
+            <a:tbl>
+              <a:tblPr>
+                <a:effectLst>
+                  <a:outerShdw blurRad="50800" dist="38100" dir="2700000" algn="tl" rotWithShape="0">
+                    <a:prstClr val="black">
+                      <a:alpha val="40000"/>
+                    </a:prstClr>
+                  </a:outerShdw>
+                </a:effectLst>
+              </a:tblPr>
+              <a:tblGrid>
+                <a:gridCol w="955569"/>
+                <a:gridCol w="916639"/>
+              </a:tblGrid>
+              <a:tr h="253953">
+                <a:tc gridSpan="2">
+                  <a:txBody>
+                    <a:bodyPr/>
+                    <a:lstStyle/>
+                    <a:p>
+                      <a:pPr algn="ctr"/>
+                      <a:r>
+                        <a:rPr lang="en-US" altLang="zh-CN" sz="1050" dirty="0" smtClean="0"/>
+                        <a:t>other properties</a:t>
+                      </a:r>
+                      <a:endParaRPr lang="zh-CN" altLang="en-US" sz="1050" dirty="0"/>
+                    </a:p>
+                  </a:txBody>
+                  <a:tcPr>
+                    <a:solidFill>
+                      <a:schemeClr val="accent4">
+                        <a:lumMod val="40000"/>
+                        <a:lumOff val="60000"/>
+                      </a:schemeClr>
+                    </a:solidFill>
+                  </a:tcPr>
+                </a:tc>
+                <a:tc hMerge="1">
+                  <a:txBody>
+                    <a:bodyPr/>
+                    <a:lstStyle/>
+                    <a:p>
+                      <a:pPr algn="ctr"/>
+                      <a:endParaRPr lang="zh-CN" altLang="en-US" sz="1050" dirty="0"/>
+                    </a:p>
+                  </a:txBody>
+                  <a:tcPr>
+                    <a:solidFill>
+                      <a:schemeClr val="accent3">
+                        <a:lumMod val="40000"/>
+                        <a:lumOff val="60000"/>
+                      </a:schemeClr>
+                    </a:solidFill>
+                  </a:tcPr>
+                </a:tc>
+              </a:tr>
+              <a:tr h="253953">
+                <a:tc>
+                  <a:txBody>
+                    <a:bodyPr/>
+                    <a:lstStyle/>
+                    <a:p>
+                      <a:pPr algn="ctr"/>
+                      <a:r>
+                        <a:rPr lang="en-US" altLang="zh-CN" sz="1050" dirty="0" smtClean="0">
+                          <a:solidFill>
+                            <a:schemeClr val="accent2"/>
+                          </a:solidFill>
+                        </a:rPr>
+                        <a:t>prototype</a:t>
+                      </a:r>
+                      <a:endParaRPr lang="zh-CN" altLang="en-US" sz="1050" dirty="0">
+                        <a:solidFill>
+                          <a:schemeClr val="accent2"/>
+                        </a:solidFill>
+                      </a:endParaRPr>
+                    </a:p>
+                  </a:txBody>
+                  <a:tcPr>
+                    <a:solidFill>
+                      <a:schemeClr val="accent4">
+                        <a:lumMod val="40000"/>
+                        <a:lumOff val="60000"/>
+                      </a:schemeClr>
+                    </a:solidFill>
+                  </a:tcPr>
+                </a:tc>
+                <a:tc>
+                  <a:txBody>
+                    <a:bodyPr/>
+                    <a:lstStyle/>
+                    <a:p>
+                      <a:pPr algn="ctr"/>
+                      <a:r>
+                        <a:rPr lang="en-US" altLang="zh-CN" sz="1050" dirty="0" smtClean="0"/>
+                        <a:t>[object]</a:t>
+                      </a:r>
+                      <a:endParaRPr lang="zh-CN" altLang="en-US" sz="1050" dirty="0"/>
+                    </a:p>
+                  </a:txBody>
+                  <a:tcPr>
+                    <a:solidFill>
+                      <a:schemeClr val="accent4">
+                        <a:lumMod val="40000"/>
+                        <a:lumOff val="60000"/>
+                      </a:schemeClr>
+                    </a:solidFill>
+                  </a:tcPr>
+                </a:tc>
+              </a:tr>
+              <a:tr h="397580">
+                <a:tc gridSpan="2">
+                  <a:txBody>
+                    <a:bodyPr/>
+                    <a:lstStyle/>
+                    <a:p>
+                      <a:pPr algn="ctr"/>
+                      <a:r>
+                        <a:rPr lang="en-US" altLang="zh-CN" sz="1200" dirty="0" smtClean="0"/>
+                        <a:t>Function</a:t>
+                      </a:r>
+                      <a:endParaRPr lang="zh-CN" altLang="en-US" sz="1050" dirty="0"/>
+                    </a:p>
+                  </a:txBody>
+                  <a:tcPr anchor="ctr">
+                    <a:solidFill>
+                      <a:schemeClr val="accent4"/>
+                    </a:solidFill>
+                  </a:tcPr>
+                </a:tc>
+                <a:tc hMerge="1">
+                  <a:txBody>
+                    <a:bodyPr/>
+                    <a:lstStyle/>
+                    <a:p>
+                      <a:endParaRPr lang="zh-CN" altLang="en-US" dirty="0"/>
+                    </a:p>
+                  </a:txBody>
+                  <a:tcPr/>
+                </a:tc>
+              </a:tr>
+              <a:tr h="253953">
+                <a:tc>
+                  <a:txBody>
+                    <a:bodyPr/>
+                    <a:lstStyle/>
+                    <a:p>
+                      <a:pPr algn="ctr"/>
+                      <a:r>
+                        <a:rPr lang="en-US" altLang="zh-CN" sz="1050" dirty="0" smtClean="0"/>
+                        <a:t>[[prototype]]</a:t>
+                      </a:r>
+                      <a:endParaRPr lang="zh-CN" altLang="en-US" sz="1050" dirty="0"/>
+                    </a:p>
+                  </a:txBody>
+                  <a:tcPr>
+                    <a:solidFill>
+                      <a:schemeClr val="bg1">
+                        <a:lumMod val="65000"/>
+                      </a:schemeClr>
+                    </a:solidFill>
+                  </a:tcPr>
+                </a:tc>
+                <a:tc>
+                  <a:txBody>
+                    <a:bodyPr/>
+                    <a:lstStyle/>
+                    <a:p>
+                      <a:pPr algn="ctr"/>
+                      <a:endParaRPr lang="zh-CN" altLang="en-US" sz="1050" dirty="0"/>
+                    </a:p>
+                  </a:txBody>
+                  <a:tcPr>
+                    <a:solidFill>
+                      <a:schemeClr val="bg1">
+                        <a:lumMod val="65000"/>
+                      </a:schemeClr>
+                    </a:solidFill>
+                  </a:tcPr>
+                </a:tc>
+              </a:tr>
+            </a:tbl>
+          </a:graphicData>
+        </a:graphic>
+      </p:graphicFrame>
+      <p:graphicFrame>
+        <p:nvGraphicFramePr>
+          <p:cNvPr id="36" name="Table 35"/>
+          <p:cNvGraphicFramePr>
+            <a:graphicFrameLocks noGrp="1"/>
+          </p:cNvGraphicFramePr>
+          <p:nvPr>
+            <p:extLst>
+              <p:ext uri="{D42A27DB-BD31-4B8C-83A1-F6EECF244321}">
+                <p14:modId xmlns:p14="http://schemas.microsoft.com/office/powerpoint/2010/main" val="4088597853"/>
+              </p:ext>
+            </p:extLst>
+          </p:nvPr>
+        </p:nvGraphicFramePr>
+        <p:xfrm>
+          <a:off x="6097806" y="908720"/>
+          <a:ext cx="2002586" cy="1159439"/>
+        </p:xfrm>
+        <a:graphic>
+          <a:graphicData uri="http://schemas.openxmlformats.org/drawingml/2006/table">
+            <a:tbl>
+              <a:tblPr>
+                <a:effectLst>
+                  <a:outerShdw blurRad="50800" dist="38100" dir="2700000" algn="tl" rotWithShape="0">
+                    <a:prstClr val="black">
+                      <a:alpha val="40000"/>
+                    </a:prstClr>
+                  </a:outerShdw>
+                </a:effectLst>
+              </a:tblPr>
+              <a:tblGrid>
+                <a:gridCol w="1022114"/>
+                <a:gridCol w="980472"/>
+              </a:tblGrid>
+              <a:tr h="253953">
+                <a:tc gridSpan="2">
+                  <a:txBody>
+                    <a:bodyPr/>
+                    <a:lstStyle/>
+                    <a:p>
+                      <a:pPr algn="ctr"/>
+                      <a:r>
+                        <a:rPr lang="en-US" altLang="zh-CN" sz="1050" dirty="0" smtClean="0"/>
+                        <a:t>other properties</a:t>
+                      </a:r>
+                      <a:endParaRPr lang="zh-CN" altLang="en-US" sz="1050" dirty="0"/>
+                    </a:p>
+                  </a:txBody>
+                  <a:tcPr>
+                    <a:solidFill>
+                      <a:schemeClr val="accent4">
+                        <a:lumMod val="40000"/>
+                        <a:lumOff val="60000"/>
+                      </a:schemeClr>
+                    </a:solidFill>
+                  </a:tcPr>
+                </a:tc>
+                <a:tc hMerge="1">
+                  <a:txBody>
+                    <a:bodyPr/>
+                    <a:lstStyle/>
+                    <a:p>
+                      <a:pPr algn="ctr"/>
+                      <a:endParaRPr lang="zh-CN" altLang="en-US" sz="1050" dirty="0"/>
+                    </a:p>
+                  </a:txBody>
+                  <a:tcPr>
+                    <a:solidFill>
+                      <a:schemeClr val="accent3">
+                        <a:lumMod val="40000"/>
+                        <a:lumOff val="60000"/>
+                      </a:schemeClr>
+                    </a:solidFill>
+                  </a:tcPr>
+                </a:tc>
+              </a:tr>
+              <a:tr h="253953">
+                <a:tc>
+                  <a:txBody>
+                    <a:bodyPr/>
+                    <a:lstStyle/>
+                    <a:p>
+                      <a:pPr algn="ctr"/>
+                      <a:r>
+                        <a:rPr lang="en-US" altLang="zh-CN" sz="1050" dirty="0" smtClean="0"/>
+                        <a:t>__proto__</a:t>
+                      </a:r>
+                      <a:endParaRPr lang="zh-CN" altLang="en-US" sz="1050" dirty="0"/>
+                    </a:p>
+                  </a:txBody>
+                  <a:tcPr>
+                    <a:solidFill>
+                      <a:schemeClr val="accent4">
+                        <a:lumMod val="40000"/>
+                        <a:lumOff val="60000"/>
+                      </a:schemeClr>
+                    </a:solidFill>
+                  </a:tcPr>
+                </a:tc>
+                <a:tc>
+                  <a:txBody>
+                    <a:bodyPr/>
+                    <a:lstStyle/>
+                    <a:p>
+                      <a:pPr algn="ctr"/>
+                      <a:r>
+                        <a:rPr lang="en-US" altLang="zh-CN" sz="1050" dirty="0" smtClean="0"/>
+                        <a:t>[getter/setter]</a:t>
+                      </a:r>
+                      <a:endParaRPr lang="zh-CN" altLang="en-US" sz="1050" dirty="0"/>
+                    </a:p>
+                  </a:txBody>
+                  <a:tcPr>
+                    <a:solidFill>
+                      <a:schemeClr val="accent4">
+                        <a:lumMod val="40000"/>
+                        <a:lumOff val="60000"/>
+                      </a:schemeClr>
+                    </a:solidFill>
+                  </a:tcPr>
+                </a:tc>
+              </a:tr>
+              <a:tr h="397580">
+                <a:tc gridSpan="2">
+                  <a:txBody>
+                    <a:bodyPr/>
+                    <a:lstStyle/>
+                    <a:p>
+                      <a:pPr algn="ctr"/>
+                      <a:r>
+                        <a:rPr lang="en-US" altLang="zh-CN" sz="1200" dirty="0" smtClean="0"/>
+                        <a:t>Object.prototype</a:t>
+                      </a:r>
+                      <a:endParaRPr lang="zh-CN" altLang="en-US" sz="1050" dirty="0"/>
+                    </a:p>
+                  </a:txBody>
+                  <a:tcPr anchor="ctr">
+                    <a:solidFill>
+                      <a:schemeClr val="accent4"/>
+                    </a:solidFill>
+                  </a:tcPr>
+                </a:tc>
+                <a:tc hMerge="1">
+                  <a:txBody>
+                    <a:bodyPr/>
+                    <a:lstStyle/>
+                    <a:p>
+                      <a:endParaRPr lang="zh-CN" altLang="en-US" dirty="0"/>
+                    </a:p>
+                  </a:txBody>
+                  <a:tcPr/>
+                </a:tc>
+              </a:tr>
+              <a:tr h="253953">
+                <a:tc>
+                  <a:txBody>
+                    <a:bodyPr/>
+                    <a:lstStyle/>
+                    <a:p>
+                      <a:pPr algn="ctr"/>
+                      <a:r>
+                        <a:rPr lang="en-US" altLang="zh-CN" sz="1050" dirty="0" smtClean="0"/>
+                        <a:t>[[prototype]]</a:t>
+                      </a:r>
+                      <a:endParaRPr lang="zh-CN" altLang="en-US" sz="1050" dirty="0"/>
+                    </a:p>
+                  </a:txBody>
+                  <a:tcPr>
+                    <a:solidFill>
+                      <a:schemeClr val="bg1">
+                        <a:lumMod val="65000"/>
+                      </a:schemeClr>
+                    </a:solidFill>
+                  </a:tcPr>
+                </a:tc>
+                <a:tc>
+                  <a:txBody>
+                    <a:bodyPr/>
+                    <a:lstStyle/>
+                    <a:p>
+                      <a:pPr algn="ctr"/>
+                      <a:r>
+                        <a:rPr lang="en-US" altLang="zh-CN" sz="1050" dirty="0" smtClean="0"/>
+                        <a:t>null</a:t>
+                      </a:r>
+                      <a:endParaRPr lang="zh-CN" altLang="en-US" sz="1050" dirty="0"/>
+                    </a:p>
+                  </a:txBody>
+                  <a:tcPr>
+                    <a:solidFill>
+                      <a:schemeClr val="bg1">
+                        <a:lumMod val="65000"/>
+                      </a:schemeClr>
+                    </a:solidFill>
+                  </a:tcPr>
+                </a:tc>
+              </a:tr>
+            </a:tbl>
+          </a:graphicData>
+        </a:graphic>
+      </p:graphicFrame>
+      <p:cxnSp>
+        <p:nvCxnSpPr>
+          <p:cNvPr id="37" name="Straight Connector 36"/>
+          <p:cNvCxnSpPr/>
+          <p:nvPr/>
+        </p:nvCxnSpPr>
+        <p:spPr>
+          <a:xfrm>
+            <a:off x="4461624" y="3926441"/>
+            <a:ext cx="1118488" cy="0"/>
+          </a:xfrm>
+          <a:prstGeom prst="line">
+            <a:avLst/>
+          </a:prstGeom>
+          <a:ln w="12700">
+            <a:headEnd type="oval"/>
+            <a:tailEnd type="stealth" w="lg" len="lg"/>
+          </a:ln>
+        </p:spPr>
+        <p:style>
+          <a:lnRef idx="1">
+            <a:schemeClr val="accent1"/>
+          </a:lnRef>
+          <a:fillRef idx="0">
+            <a:schemeClr val="accent1"/>
+          </a:fillRef>
+          <a:effectRef idx="0">
+            <a:schemeClr val="accent1"/>
+          </a:effectRef>
+          <a:fontRef idx="minor">
+            <a:schemeClr val="tx1"/>
+          </a:fontRef>
+        </p:style>
+      </p:cxnSp>
+      <p:cxnSp>
+        <p:nvCxnSpPr>
+          <p:cNvPr id="40" name="Elbow Connector 39"/>
+          <p:cNvCxnSpPr>
+            <a:endCxn id="36" idx="3"/>
+          </p:cNvCxnSpPr>
+          <p:nvPr/>
+        </p:nvCxnSpPr>
+        <p:spPr>
+          <a:xfrm rot="5400000" flipH="1" flipV="1">
+            <a:off x="6213048" y="2439679"/>
+            <a:ext cx="2838584" cy="936104"/>
+          </a:xfrm>
+          <a:prstGeom prst="bentConnector4">
+            <a:avLst>
+              <a:gd name="adj1" fmla="val 30"/>
+              <a:gd name="adj2" fmla="val 147300"/>
+            </a:avLst>
+          </a:prstGeom>
+          <a:ln w="12700">
+            <a:headEnd type="oval" w="med" len="med"/>
+            <a:tailEnd type="stealth" w="lg" len="lg"/>
+          </a:ln>
+        </p:spPr>
+        <p:style>
+          <a:lnRef idx="1">
+            <a:schemeClr val="accent1"/>
+          </a:lnRef>
+          <a:fillRef idx="0">
+            <a:schemeClr val="accent1"/>
+          </a:fillRef>
+          <a:effectRef idx="0">
+            <a:schemeClr val="accent1"/>
+          </a:effectRef>
+          <a:fontRef idx="minor">
+            <a:schemeClr val="tx1"/>
+          </a:fontRef>
+        </p:style>
+      </p:cxnSp>
+      <p:cxnSp>
+        <p:nvCxnSpPr>
+          <p:cNvPr id="47" name="Straight Connector 46"/>
+          <p:cNvCxnSpPr/>
+          <p:nvPr/>
+        </p:nvCxnSpPr>
+        <p:spPr>
+          <a:xfrm>
+            <a:off x="7308304" y="5301208"/>
+            <a:ext cx="684078" cy="0"/>
+          </a:xfrm>
+          <a:prstGeom prst="line">
+            <a:avLst/>
+          </a:prstGeom>
+          <a:ln w="12700">
+            <a:prstDash val="dash"/>
+            <a:headEnd type="oval"/>
+          </a:ln>
+        </p:spPr>
+        <p:style>
+          <a:lnRef idx="1">
+            <a:schemeClr val="accent1"/>
+          </a:lnRef>
+          <a:fillRef idx="0">
+            <a:schemeClr val="accent1"/>
+          </a:fillRef>
+          <a:effectRef idx="0">
+            <a:schemeClr val="accent1"/>
+          </a:effectRef>
+          <a:fontRef idx="minor">
+            <a:schemeClr val="tx1"/>
+          </a:fontRef>
+        </p:style>
+      </p:cxnSp>
+      <p:cxnSp>
+        <p:nvCxnSpPr>
+          <p:cNvPr id="48" name="Elbow Connector 47"/>
+          <p:cNvCxnSpPr/>
+          <p:nvPr/>
+        </p:nvCxnSpPr>
+        <p:spPr>
+          <a:xfrm rot="16200000" flipV="1">
+            <a:off x="7046389" y="4371691"/>
+            <a:ext cx="1354976" cy="504057"/>
+          </a:xfrm>
+          <a:prstGeom prst="bentConnector3">
+            <a:avLst>
+              <a:gd name="adj1" fmla="val 100461"/>
+            </a:avLst>
+          </a:prstGeom>
+          <a:ln w="12700">
+            <a:prstDash val="dash"/>
+            <a:headEnd type="none" w="lg" len="lg"/>
+            <a:tailEnd type="stealth" w="lg" len="lg"/>
+          </a:ln>
+        </p:spPr>
+        <p:style>
+          <a:lnRef idx="1">
+            <a:schemeClr val="accent1"/>
+          </a:lnRef>
+          <a:fillRef idx="0">
+            <a:schemeClr val="accent1"/>
+          </a:fillRef>
+          <a:effectRef idx="0">
+            <a:schemeClr val="accent1"/>
+          </a:effectRef>
+          <a:fontRef idx="minor">
+            <a:schemeClr val="tx1"/>
+          </a:fontRef>
+        </p:style>
+      </p:cxnSp>
+      <p:cxnSp>
+        <p:nvCxnSpPr>
+          <p:cNvPr id="67" name="Straight Connector 66"/>
+          <p:cNvCxnSpPr/>
+          <p:nvPr/>
+        </p:nvCxnSpPr>
+        <p:spPr>
+          <a:xfrm>
+            <a:off x="7164288" y="6004812"/>
+            <a:ext cx="1080120" cy="0"/>
+          </a:xfrm>
+          <a:prstGeom prst="line">
+            <a:avLst/>
+          </a:prstGeom>
+          <a:ln w="12700">
+            <a:prstDash val="solid"/>
+            <a:headEnd type="oval"/>
+          </a:ln>
+        </p:spPr>
+        <p:style>
+          <a:lnRef idx="1">
+            <a:schemeClr val="accent1"/>
+          </a:lnRef>
+          <a:fillRef idx="0">
+            <a:schemeClr val="accent1"/>
+          </a:fillRef>
+          <a:effectRef idx="0">
+            <a:schemeClr val="accent1"/>
+          </a:effectRef>
+          <a:fontRef idx="minor">
+            <a:schemeClr val="tx1"/>
+          </a:fontRef>
+        </p:style>
+      </p:cxnSp>
+      <p:cxnSp>
+        <p:nvCxnSpPr>
+          <p:cNvPr id="72" name="Elbow Connector 71"/>
+          <p:cNvCxnSpPr/>
+          <p:nvPr/>
+        </p:nvCxnSpPr>
+        <p:spPr>
+          <a:xfrm rot="16200000" flipV="1">
+            <a:off x="6894260" y="4654660"/>
+            <a:ext cx="1927740" cy="772563"/>
+          </a:xfrm>
+          <a:prstGeom prst="bentConnector3">
+            <a:avLst>
+              <a:gd name="adj1" fmla="val 100425"/>
+            </a:avLst>
+          </a:prstGeom>
+          <a:ln w="12700">
+            <a:prstDash val="solid"/>
+            <a:headEnd type="none" w="lg" len="lg"/>
+            <a:tailEnd type="stealth" w="lg" len="lg"/>
+          </a:ln>
+        </p:spPr>
+        <p:style>
+          <a:lnRef idx="1">
+            <a:schemeClr val="accent1"/>
+          </a:lnRef>
+          <a:fillRef idx="0">
+            <a:schemeClr val="accent1"/>
+          </a:fillRef>
+          <a:effectRef idx="0">
+            <a:schemeClr val="accent1"/>
+          </a:effectRef>
+          <a:fontRef idx="minor">
+            <a:schemeClr val="tx1"/>
+          </a:fontRef>
+        </p:style>
+      </p:cxnSp>
+      <p:cxnSp>
+        <p:nvCxnSpPr>
+          <p:cNvPr id="80" name="Straight Connector 79"/>
+          <p:cNvCxnSpPr/>
+          <p:nvPr/>
+        </p:nvCxnSpPr>
+        <p:spPr>
+          <a:xfrm>
+            <a:off x="1619672" y="5517232"/>
+            <a:ext cx="686440" cy="0"/>
+          </a:xfrm>
+          <a:prstGeom prst="line">
+            <a:avLst/>
+          </a:prstGeom>
+          <a:ln w="12700">
+            <a:prstDash val="dash"/>
+            <a:headEnd type="oval"/>
+            <a:tailEnd type="stealth" w="lg" len="lg"/>
+          </a:ln>
+        </p:spPr>
+        <p:style>
+          <a:lnRef idx="1">
+            <a:schemeClr val="accent1"/>
+          </a:lnRef>
+          <a:fillRef idx="0">
+            <a:schemeClr val="accent1"/>
+          </a:fillRef>
+          <a:effectRef idx="0">
+            <a:schemeClr val="accent1"/>
+          </a:effectRef>
+          <a:fontRef idx="minor">
+            <a:schemeClr val="tx1"/>
+          </a:fontRef>
+        </p:style>
+      </p:cxnSp>
+      <p:cxnSp>
+        <p:nvCxnSpPr>
+          <p:cNvPr id="83" name="Straight Connector 82"/>
+          <p:cNvCxnSpPr/>
+          <p:nvPr/>
+        </p:nvCxnSpPr>
+        <p:spPr>
+          <a:xfrm>
+            <a:off x="1619672" y="5805264"/>
+            <a:ext cx="686440" cy="0"/>
+          </a:xfrm>
+          <a:prstGeom prst="line">
+            <a:avLst/>
+          </a:prstGeom>
+          <a:ln w="12700">
+            <a:headEnd type="oval"/>
+            <a:tailEnd type="stealth" w="lg" len="lg"/>
+          </a:ln>
+        </p:spPr>
+        <p:style>
+          <a:lnRef idx="1">
+            <a:schemeClr val="accent1"/>
+          </a:lnRef>
+          <a:fillRef idx="0">
+            <a:schemeClr val="accent1"/>
+          </a:fillRef>
+          <a:effectRef idx="0">
+            <a:schemeClr val="accent1"/>
+          </a:effectRef>
+          <a:fontRef idx="minor">
+            <a:schemeClr val="tx1"/>
+          </a:fontRef>
+        </p:style>
+      </p:cxnSp>
+      <p:sp>
+        <p:nvSpPr>
+          <p:cNvPr id="84" name="TextBox 83"/>
+          <p:cNvSpPr txBox="1"/>
+          <p:nvPr/>
+        </p:nvSpPr>
+        <p:spPr>
+          <a:xfrm>
+            <a:off x="2265390" y="5666764"/>
+            <a:ext cx="1200970" cy="276999"/>
+          </a:xfrm>
+          <a:prstGeom prst="rect">
+            <a:avLst/>
+          </a:prstGeom>
+          <a:noFill/>
+        </p:spPr>
+        <p:txBody>
+          <a:bodyPr wrap="none" rtlCol="0">
+            <a:spAutoFit/>
+          </a:bodyPr>
+          <a:lstStyle/>
+          <a:p>
+            <a:pPr algn="just"/>
+            <a:r>
+              <a:rPr lang="zh-CN" altLang="en-US" sz="1200" dirty="0" smtClean="0"/>
+              <a:t>原型</a:t>
+            </a:r>
+            <a:r>
+              <a:rPr lang="en-US" altLang="zh-CN" sz="1200" dirty="0" smtClean="0"/>
+              <a:t>(</a:t>
+            </a:r>
+            <a:r>
+              <a:rPr lang="zh-CN" altLang="en-US" sz="1200" dirty="0" smtClean="0"/>
+              <a:t>继承关系</a:t>
+            </a:r>
+            <a:r>
+              <a:rPr lang="en-US" altLang="zh-CN" sz="1200" dirty="0" smtClean="0"/>
+              <a:t>)</a:t>
+            </a:r>
+            <a:endParaRPr lang="zh-CN" altLang="en-US" sz="1200" dirty="0"/>
+          </a:p>
+        </p:txBody>
+      </p:sp>
+      <p:sp>
+        <p:nvSpPr>
+          <p:cNvPr id="85" name="TextBox 84"/>
+          <p:cNvSpPr txBox="1"/>
+          <p:nvPr/>
+        </p:nvSpPr>
+        <p:spPr>
+          <a:xfrm>
+            <a:off x="2267744" y="5402285"/>
+            <a:ext cx="800219" cy="276999"/>
+          </a:xfrm>
+          <a:prstGeom prst="rect">
+            <a:avLst/>
+          </a:prstGeom>
+          <a:noFill/>
+        </p:spPr>
+        <p:txBody>
+          <a:bodyPr wrap="none" rtlCol="0">
+            <a:spAutoFit/>
+          </a:bodyPr>
+          <a:lstStyle/>
+          <a:p>
+            <a:pPr algn="just"/>
+            <a:r>
+              <a:rPr lang="zh-CN" altLang="en-US" sz="1200" dirty="0" smtClean="0"/>
+              <a:t>对象引用</a:t>
+            </a:r>
+            <a:endParaRPr lang="zh-CN" altLang="en-US" sz="1200" dirty="0"/>
+          </a:p>
+        </p:txBody>
+      </p:sp>
+    </p:spTree>
+    <p:extLst>
+      <p:ext uri="{BB962C8B-B14F-4D97-AF65-F5344CB8AC3E}">
+        <p14:creationId xmlns:p14="http://schemas.microsoft.com/office/powerpoint/2010/main" val="4215800408"/>
       </p:ext>
     </p:extLst>
   </p:cSld>

</xml_diff>

<commit_message>
revisied the full inheritance chart
</commit_message>
<xml_diff>
--- a/utilities/Utilities.pptx
+++ b/utilities/Utilities.pptx
@@ -291,7 +291,7 @@
           <a:p>
             <a:fld id="{B1E51262-F3D9-492B-90BF-8E4569FE00B5}" type="datetimeFigureOut">
               <a:rPr lang="zh-CN" altLang="en-US" smtClean="0"/>
-              <a:t>2016/9/18</a:t>
+              <a:t>2016/9/19</a:t>
             </a:fld>
             <a:endParaRPr lang="zh-CN" altLang="en-US"/>
           </a:p>
@@ -461,7 +461,7 @@
           <a:p>
             <a:fld id="{B1E51262-F3D9-492B-90BF-8E4569FE00B5}" type="datetimeFigureOut">
               <a:rPr lang="zh-CN" altLang="en-US" smtClean="0"/>
-              <a:t>2016/9/18</a:t>
+              <a:t>2016/9/19</a:t>
             </a:fld>
             <a:endParaRPr lang="zh-CN" altLang="en-US"/>
           </a:p>
@@ -641,7 +641,7 @@
           <a:p>
             <a:fld id="{B1E51262-F3D9-492B-90BF-8E4569FE00B5}" type="datetimeFigureOut">
               <a:rPr lang="zh-CN" altLang="en-US" smtClean="0"/>
-              <a:t>2016/9/18</a:t>
+              <a:t>2016/9/19</a:t>
             </a:fld>
             <a:endParaRPr lang="zh-CN" altLang="en-US"/>
           </a:p>
@@ -811,7 +811,7 @@
           <a:p>
             <a:fld id="{B1E51262-F3D9-492B-90BF-8E4569FE00B5}" type="datetimeFigureOut">
               <a:rPr lang="zh-CN" altLang="en-US" smtClean="0"/>
-              <a:t>2016/9/18</a:t>
+              <a:t>2016/9/19</a:t>
             </a:fld>
             <a:endParaRPr lang="zh-CN" altLang="en-US"/>
           </a:p>
@@ -1057,7 +1057,7 @@
           <a:p>
             <a:fld id="{B1E51262-F3D9-492B-90BF-8E4569FE00B5}" type="datetimeFigureOut">
               <a:rPr lang="zh-CN" altLang="en-US" smtClean="0"/>
-              <a:t>2016/9/18</a:t>
+              <a:t>2016/9/19</a:t>
             </a:fld>
             <a:endParaRPr lang="zh-CN" altLang="en-US"/>
           </a:p>
@@ -1345,7 +1345,7 @@
           <a:p>
             <a:fld id="{B1E51262-F3D9-492B-90BF-8E4569FE00B5}" type="datetimeFigureOut">
               <a:rPr lang="zh-CN" altLang="en-US" smtClean="0"/>
-              <a:t>2016/9/18</a:t>
+              <a:t>2016/9/19</a:t>
             </a:fld>
             <a:endParaRPr lang="zh-CN" altLang="en-US"/>
           </a:p>
@@ -1767,7 +1767,7 @@
           <a:p>
             <a:fld id="{B1E51262-F3D9-492B-90BF-8E4569FE00B5}" type="datetimeFigureOut">
               <a:rPr lang="zh-CN" altLang="en-US" smtClean="0"/>
-              <a:t>2016/9/18</a:t>
+              <a:t>2016/9/19</a:t>
             </a:fld>
             <a:endParaRPr lang="zh-CN" altLang="en-US"/>
           </a:p>
@@ -1885,7 +1885,7 @@
           <a:p>
             <a:fld id="{B1E51262-F3D9-492B-90BF-8E4569FE00B5}" type="datetimeFigureOut">
               <a:rPr lang="zh-CN" altLang="en-US" smtClean="0"/>
-              <a:t>2016/9/18</a:t>
+              <a:t>2016/9/19</a:t>
             </a:fld>
             <a:endParaRPr lang="zh-CN" altLang="en-US"/>
           </a:p>
@@ -1980,7 +1980,7 @@
           <a:p>
             <a:fld id="{B1E51262-F3D9-492B-90BF-8E4569FE00B5}" type="datetimeFigureOut">
               <a:rPr lang="zh-CN" altLang="en-US" smtClean="0"/>
-              <a:t>2016/9/18</a:t>
+              <a:t>2016/9/19</a:t>
             </a:fld>
             <a:endParaRPr lang="zh-CN" altLang="en-US"/>
           </a:p>
@@ -2257,7 +2257,7 @@
           <a:p>
             <a:fld id="{B1E51262-F3D9-492B-90BF-8E4569FE00B5}" type="datetimeFigureOut">
               <a:rPr lang="zh-CN" altLang="en-US" smtClean="0"/>
-              <a:t>2016/9/18</a:t>
+              <a:t>2016/9/19</a:t>
             </a:fld>
             <a:endParaRPr lang="zh-CN" altLang="en-US"/>
           </a:p>
@@ -2510,7 +2510,7 @@
           <a:p>
             <a:fld id="{B1E51262-F3D9-492B-90BF-8E4569FE00B5}" type="datetimeFigureOut">
               <a:rPr lang="zh-CN" altLang="en-US" smtClean="0"/>
-              <a:t>2016/9/18</a:t>
+              <a:t>2016/9/19</a:t>
             </a:fld>
             <a:endParaRPr lang="zh-CN" altLang="en-US"/>
           </a:p>
@@ -2723,7 +2723,7 @@
           <a:p>
             <a:fld id="{B1E51262-F3D9-492B-90BF-8E4569FE00B5}" type="datetimeFigureOut">
               <a:rPr lang="zh-CN" altLang="en-US" smtClean="0"/>
-              <a:t>2016/9/18</a:t>
+              <a:t>2016/9/19</a:t>
             </a:fld>
             <a:endParaRPr lang="zh-CN" altLang="en-US"/>
           </a:p>
@@ -4326,13 +4326,13 @@
           <p:nvPr>
             <p:extLst>
               <p:ext uri="{D42A27DB-BD31-4B8C-83A1-F6EECF244321}">
-                <p14:modId xmlns:p14="http://schemas.microsoft.com/office/powerpoint/2010/main" val="2059401359"/>
+                <p14:modId xmlns:p14="http://schemas.microsoft.com/office/powerpoint/2010/main" val="2395827954"/>
               </p:ext>
             </p:extLst>
           </p:nvPr>
         </p:nvGraphicFramePr>
         <p:xfrm>
-          <a:off x="539552" y="1094854"/>
+          <a:off x="539552" y="1663607"/>
           <a:ext cx="1872208" cy="1160659"/>
         </p:xfrm>
         <a:graphic>
@@ -4451,7 +4451,7 @@
                     <a:p>
                       <a:pPr algn="ctr"/>
                       <a:r>
-                        <a:rPr lang="en-US" altLang="zh-CN" sz="1200" dirty="0" err="1" smtClean="0"/>
+                        <a:rPr lang="en-US" altLang="zh-CN" sz="1200" dirty="0" smtClean="0"/>
                         <a:t>rect</a:t>
                       </a:r>
                       <a:endParaRPr lang="zh-CN" altLang="en-US" sz="1050" dirty="0"/>
@@ -4527,13 +4527,13 @@
           <p:nvPr>
             <p:extLst>
               <p:ext uri="{D42A27DB-BD31-4B8C-83A1-F6EECF244321}">
-                <p14:modId xmlns:p14="http://schemas.microsoft.com/office/powerpoint/2010/main" val="2147571540"/>
+                <p14:modId xmlns:p14="http://schemas.microsoft.com/office/powerpoint/2010/main" val="628694225"/>
               </p:ext>
             </p:extLst>
           </p:nvPr>
         </p:nvGraphicFramePr>
         <p:xfrm>
-          <a:off x="2899544" y="2906121"/>
+          <a:off x="2899544" y="3474874"/>
           <a:ext cx="1872208" cy="1142763"/>
         </p:xfrm>
         <a:graphic>
@@ -4732,13 +4732,13 @@
           <p:nvPr>
             <p:extLst>
               <p:ext uri="{D42A27DB-BD31-4B8C-83A1-F6EECF244321}">
-                <p14:modId xmlns:p14="http://schemas.microsoft.com/office/powerpoint/2010/main" val="4244082876"/>
+                <p14:modId xmlns:p14="http://schemas.microsoft.com/office/powerpoint/2010/main" val="525875444"/>
               </p:ext>
             </p:extLst>
           </p:nvPr>
         </p:nvGraphicFramePr>
         <p:xfrm>
-          <a:off x="5588350" y="3282637"/>
+          <a:off x="5588350" y="3851390"/>
           <a:ext cx="1872208" cy="1159439"/>
         </p:xfrm>
         <a:graphic>
@@ -4809,14 +4809,14 @@
                       <a:r>
                         <a:rPr lang="en-US" altLang="zh-CN" sz="1050" dirty="0" smtClean="0">
                           <a:solidFill>
-                            <a:schemeClr val="accent2"/>
+                            <a:schemeClr val="tx1"/>
                           </a:solidFill>
                         </a:rPr>
-                        <a:t>prototype</a:t>
+                        <a:t>arguments</a:t>
                       </a:r>
                       <a:endParaRPr lang="zh-CN" altLang="en-US" sz="1050" dirty="0">
                         <a:solidFill>
-                          <a:schemeClr val="accent2"/>
+                          <a:schemeClr val="tx1"/>
                         </a:solidFill>
                       </a:endParaRPr>
                     </a:p>
@@ -4836,10 +4836,6 @@
                     <a:lstStyle/>
                     <a:p>
                       <a:pPr algn="ctr"/>
-                      <a:r>
-                        <a:rPr lang="en-US" altLang="zh-CN" sz="1050" dirty="0" smtClean="0"/>
-                        <a:t>[object]</a:t>
-                      </a:r>
                       <a:endParaRPr lang="zh-CN" altLang="en-US" sz="1050" dirty="0"/>
                     </a:p>
                   </a:txBody>
@@ -4936,7 +4932,7 @@
         </p:nvCxnSpPr>
         <p:spPr>
           <a:xfrm>
-            <a:off x="1891432" y="2118003"/>
+            <a:off x="1891432" y="2686756"/>
             <a:ext cx="1008112" cy="0"/>
           </a:xfrm>
           <a:prstGeom prst="line">
@@ -4971,13 +4967,13 @@
           <p:nvPr>
             <p:extLst>
               <p:ext uri="{D42A27DB-BD31-4B8C-83A1-F6EECF244321}">
-                <p14:modId xmlns:p14="http://schemas.microsoft.com/office/powerpoint/2010/main" val="281328353"/>
+                <p14:modId xmlns:p14="http://schemas.microsoft.com/office/powerpoint/2010/main" val="716782792"/>
               </p:ext>
             </p:extLst>
           </p:nvPr>
         </p:nvGraphicFramePr>
         <p:xfrm>
-          <a:off x="2899544" y="1406161"/>
+          <a:off x="2899544" y="1974914"/>
           <a:ext cx="1872208" cy="1142763"/>
         </p:xfrm>
         <a:graphic>
@@ -5171,7 +5167,7 @@
         </p:nvCxnSpPr>
         <p:spPr>
           <a:xfrm>
-            <a:off x="4606998" y="3282637"/>
+            <a:off x="4606998" y="3851390"/>
             <a:ext cx="432048" cy="0"/>
           </a:xfrm>
           <a:prstGeom prst="line">
@@ -5205,7 +5201,7 @@
         </p:nvCxnSpPr>
         <p:spPr>
           <a:xfrm rot="16200000" flipV="1">
-            <a:off x="4322875" y="2566465"/>
+            <a:off x="4322875" y="3135218"/>
             <a:ext cx="1165050" cy="267295"/>
           </a:xfrm>
           <a:prstGeom prst="bentConnector2">
@@ -5240,7 +5236,7 @@
         </p:nvCxnSpPr>
         <p:spPr>
           <a:xfrm>
-            <a:off x="4639280" y="1541939"/>
+            <a:off x="4639280" y="2110692"/>
             <a:ext cx="652800" cy="0"/>
           </a:xfrm>
           <a:prstGeom prst="line">
@@ -5274,7 +5270,7 @@
         </p:nvCxnSpPr>
         <p:spPr>
           <a:xfrm rot="10800000">
-            <a:off x="4804120" y="3630176"/>
+            <a:off x="4804120" y="4198929"/>
             <a:ext cx="487961" cy="3"/>
           </a:xfrm>
           <a:prstGeom prst="bentConnector3">
@@ -5311,7 +5307,7 @@
         </p:nvCxnSpPr>
         <p:spPr>
           <a:xfrm flipV="1">
-            <a:off x="5292080" y="1541940"/>
+            <a:off x="5292080" y="2110693"/>
             <a:ext cx="0" cy="2088230"/>
           </a:xfrm>
           <a:prstGeom prst="line">
@@ -5345,17 +5341,16 @@
           <p:nvPr/>
         </p:nvCxnSpPr>
         <p:spPr>
-          <a:xfrm flipV="1">
-            <a:off x="4499992" y="1488439"/>
-            <a:ext cx="1597814" cy="923700"/>
+          <a:xfrm rot="5400000" flipH="1" flipV="1">
+            <a:off x="4829372" y="1735123"/>
+            <a:ext cx="2156586" cy="367074"/>
           </a:xfrm>
-          <a:prstGeom prst="bentConnector3">
-            <a:avLst>
-              <a:gd name="adj1" fmla="val 71654"/>
-            </a:avLst>
+          <a:prstGeom prst="bentConnector2">
+            <a:avLst/>
           </a:prstGeom>
           <a:ln w="12700">
-            <a:headEnd type="oval" w="med" len="med"/>
+            <a:round/>
+            <a:headEnd type="none" w="med" len="med"/>
             <a:tailEnd type="stealth" w="lg" len="lg"/>
           </a:ln>
         </p:spPr>
@@ -5383,13 +5378,13 @@
           <p:nvPr>
             <p:extLst>
               <p:ext uri="{D42A27DB-BD31-4B8C-83A1-F6EECF244321}">
-                <p14:modId xmlns:p14="http://schemas.microsoft.com/office/powerpoint/2010/main" val="3798901532"/>
+                <p14:modId xmlns:p14="http://schemas.microsoft.com/office/powerpoint/2010/main" val="84637082"/>
               </p:ext>
             </p:extLst>
           </p:nvPr>
         </p:nvGraphicFramePr>
         <p:xfrm>
-          <a:off x="5609091" y="4941168"/>
+          <a:off x="5609091" y="5509921"/>
           <a:ext cx="1872208" cy="1159439"/>
         </p:xfrm>
         <a:graphic>
@@ -5588,13 +5583,13 @@
           <p:nvPr>
             <p:extLst>
               <p:ext uri="{D42A27DB-BD31-4B8C-83A1-F6EECF244321}">
-                <p14:modId xmlns:p14="http://schemas.microsoft.com/office/powerpoint/2010/main" val="4088597853"/>
+                <p14:modId xmlns:p14="http://schemas.microsoft.com/office/powerpoint/2010/main" val="3780872224"/>
               </p:ext>
             </p:extLst>
           </p:nvPr>
         </p:nvGraphicFramePr>
         <p:xfrm>
-          <a:off x="6097806" y="908720"/>
+          <a:off x="6091202" y="260648"/>
           <a:ext cx="2002586" cy="1159439"/>
         </p:xfrm>
         <a:graphic>
@@ -5788,7 +5783,7 @@
         </p:nvCxnSpPr>
         <p:spPr>
           <a:xfrm>
-            <a:off x="4461624" y="3926441"/>
+            <a:off x="4461624" y="4495194"/>
             <a:ext cx="1118488" cy="0"/>
           </a:xfrm>
           <a:prstGeom prst="line">
@@ -5824,13 +5819,13 @@
         </p:nvCxnSpPr>
         <p:spPr>
           <a:xfrm rot="5400000" flipH="1" flipV="1">
-            <a:off x="6213048" y="2439679"/>
-            <a:ext cx="2838584" cy="936104"/>
+            <a:off x="5542635" y="2318007"/>
+            <a:ext cx="4028793" cy="1073514"/>
           </a:xfrm>
           <a:prstGeom prst="bentConnector4">
             <a:avLst>
-              <a:gd name="adj1" fmla="val 30"/>
-              <a:gd name="adj2" fmla="val 147300"/>
+              <a:gd name="adj1" fmla="val 683"/>
+              <a:gd name="adj2" fmla="val 142014"/>
             </a:avLst>
           </a:prstGeom>
           <a:ln w="12700">
@@ -5861,7 +5856,7 @@
         </p:nvCxnSpPr>
         <p:spPr>
           <a:xfrm>
-            <a:off x="7308304" y="5301208"/>
+            <a:off x="7308304" y="5869961"/>
             <a:ext cx="684078" cy="0"/>
           </a:xfrm>
           <a:prstGeom prst="line">
@@ -5895,7 +5890,7 @@
         </p:nvCxnSpPr>
         <p:spPr>
           <a:xfrm rot="16200000" flipV="1">
-            <a:off x="7046389" y="4371691"/>
+            <a:off x="7046389" y="4940444"/>
             <a:ext cx="1354976" cy="504057"/>
           </a:xfrm>
           <a:prstGeom prst="bentConnector3">
@@ -5932,7 +5927,7 @@
         </p:nvCxnSpPr>
         <p:spPr>
           <a:xfrm>
-            <a:off x="7164288" y="6004812"/>
+            <a:off x="7164288" y="6573565"/>
             <a:ext cx="1080120" cy="0"/>
           </a:xfrm>
           <a:prstGeom prst="line">
@@ -5966,7 +5961,7 @@
         </p:nvCxnSpPr>
         <p:spPr>
           <a:xfrm rot="16200000" flipV="1">
-            <a:off x="6894260" y="4654660"/>
+            <a:off x="6894260" y="5223413"/>
             <a:ext cx="1927740" cy="772563"/>
           </a:xfrm>
           <a:prstGeom prst="bentConnector3">
@@ -6003,7 +5998,7 @@
         </p:nvCxnSpPr>
         <p:spPr>
           <a:xfrm>
-            <a:off x="1619672" y="5517232"/>
+            <a:off x="716689" y="5659454"/>
             <a:ext cx="686440" cy="0"/>
           </a:xfrm>
           <a:prstGeom prst="line">
@@ -6038,7 +6033,7 @@
         </p:nvCxnSpPr>
         <p:spPr>
           <a:xfrm>
-            <a:off x="1619672" y="5805264"/>
+            <a:off x="716689" y="5947486"/>
             <a:ext cx="686440" cy="0"/>
           </a:xfrm>
           <a:prstGeom prst="line">
@@ -6072,7 +6067,7 @@
         </p:nvSpPr>
         <p:spPr>
           <a:xfrm>
-            <a:off x="2265390" y="5666764"/>
+            <a:off x="1362407" y="5808986"/>
             <a:ext cx="1200970" cy="276999"/>
           </a:xfrm>
           <a:prstGeom prst="rect">
@@ -6115,7 +6110,7 @@
         </p:nvSpPr>
         <p:spPr>
           <a:xfrm>
-            <a:off x="2267744" y="5402285"/>
+            <a:off x="1364761" y="5544507"/>
             <a:ext cx="800219" cy="276999"/>
           </a:xfrm>
           <a:prstGeom prst="rect">
@@ -6138,6 +6133,353 @@
           </a:p>
         </p:txBody>
       </p:sp>
+      <p:graphicFrame>
+        <p:nvGraphicFramePr>
+          <p:cNvPr id="25" name="Table 24"/>
+          <p:cNvGraphicFramePr>
+            <a:graphicFrameLocks noGrp="1"/>
+          </p:cNvGraphicFramePr>
+          <p:nvPr>
+            <p:extLst>
+              <p:ext uri="{D42A27DB-BD31-4B8C-83A1-F6EECF244321}">
+                <p14:modId xmlns:p14="http://schemas.microsoft.com/office/powerpoint/2010/main" val="2023913586"/>
+              </p:ext>
+            </p:extLst>
+          </p:nvPr>
+        </p:nvGraphicFramePr>
+        <p:xfrm>
+          <a:off x="6091202" y="2060848"/>
+          <a:ext cx="2081198" cy="1159439"/>
+        </p:xfrm>
+        <a:graphic>
+          <a:graphicData uri="http://schemas.openxmlformats.org/drawingml/2006/table">
+            <a:tbl>
+              <a:tblPr>
+                <a:effectLst>
+                  <a:outerShdw blurRad="50800" dist="38100" dir="2700000" algn="tl" rotWithShape="0">
+                    <a:prstClr val="black">
+                      <a:alpha val="40000"/>
+                    </a:prstClr>
+                  </a:outerShdw>
+                </a:effectLst>
+              </a:tblPr>
+              <a:tblGrid>
+                <a:gridCol w="1062236"/>
+                <a:gridCol w="1018962"/>
+              </a:tblGrid>
+              <a:tr h="253953">
+                <a:tc gridSpan="2">
+                  <a:txBody>
+                    <a:bodyPr/>
+                    <a:lstStyle/>
+                    <a:p>
+                      <a:pPr algn="ctr"/>
+                      <a:r>
+                        <a:rPr lang="en-US" altLang="zh-CN" sz="1050" dirty="0" smtClean="0"/>
+                        <a:t>other properties</a:t>
+                      </a:r>
+                      <a:endParaRPr lang="zh-CN" altLang="en-US" sz="1050" dirty="0"/>
+                    </a:p>
+                  </a:txBody>
+                  <a:tcPr>
+                    <a:solidFill>
+                      <a:schemeClr val="accent4">
+                        <a:lumMod val="40000"/>
+                        <a:lumOff val="60000"/>
+                      </a:schemeClr>
+                    </a:solidFill>
+                  </a:tcPr>
+                </a:tc>
+                <a:tc hMerge="1">
+                  <a:txBody>
+                    <a:bodyPr/>
+                    <a:lstStyle/>
+                    <a:p>
+                      <a:pPr algn="ctr"/>
+                      <a:endParaRPr lang="zh-CN" altLang="en-US" sz="1050" dirty="0"/>
+                    </a:p>
+                  </a:txBody>
+                  <a:tcPr>
+                    <a:solidFill>
+                      <a:schemeClr val="accent3">
+                        <a:lumMod val="40000"/>
+                        <a:lumOff val="60000"/>
+                      </a:schemeClr>
+                    </a:solidFill>
+                  </a:tcPr>
+                </a:tc>
+              </a:tr>
+              <a:tr h="253953">
+                <a:tc>
+                  <a:txBody>
+                    <a:bodyPr/>
+                    <a:lstStyle/>
+                    <a:p>
+                      <a:pPr algn="ctr"/>
+                      <a:r>
+                        <a:rPr lang="en-US" altLang="zh-CN" sz="1050" dirty="0" smtClean="0">
+                          <a:solidFill>
+                            <a:schemeClr val="accent2"/>
+                          </a:solidFill>
+                        </a:rPr>
+                        <a:t>prototype</a:t>
+                      </a:r>
+                      <a:endParaRPr lang="zh-CN" altLang="en-US" sz="1050" dirty="0">
+                        <a:solidFill>
+                          <a:schemeClr val="accent2"/>
+                        </a:solidFill>
+                      </a:endParaRPr>
+                    </a:p>
+                  </a:txBody>
+                  <a:tcPr>
+                    <a:solidFill>
+                      <a:schemeClr val="accent4">
+                        <a:lumMod val="40000"/>
+                        <a:lumOff val="60000"/>
+                      </a:schemeClr>
+                    </a:solidFill>
+                  </a:tcPr>
+                </a:tc>
+                <a:tc>
+                  <a:txBody>
+                    <a:bodyPr/>
+                    <a:lstStyle/>
+                    <a:p>
+                      <a:pPr algn="ctr"/>
+                      <a:r>
+                        <a:rPr lang="en-US" altLang="zh-CN" sz="1050" dirty="0" smtClean="0"/>
+                        <a:t>[object]</a:t>
+                      </a:r>
+                      <a:endParaRPr lang="zh-CN" altLang="en-US" sz="1050" dirty="0"/>
+                    </a:p>
+                  </a:txBody>
+                  <a:tcPr>
+                    <a:solidFill>
+                      <a:schemeClr val="accent4">
+                        <a:lumMod val="40000"/>
+                        <a:lumOff val="60000"/>
+                      </a:schemeClr>
+                    </a:solidFill>
+                  </a:tcPr>
+                </a:tc>
+              </a:tr>
+              <a:tr h="397580">
+                <a:tc gridSpan="2">
+                  <a:txBody>
+                    <a:bodyPr/>
+                    <a:lstStyle/>
+                    <a:p>
+                      <a:pPr algn="ctr"/>
+                      <a:r>
+                        <a:rPr lang="en-US" altLang="zh-CN" sz="1200" dirty="0" smtClean="0"/>
+                        <a:t>Object</a:t>
+                      </a:r>
+                      <a:endParaRPr lang="zh-CN" altLang="en-US" sz="1050" dirty="0"/>
+                    </a:p>
+                  </a:txBody>
+                  <a:tcPr anchor="ctr">
+                    <a:solidFill>
+                      <a:schemeClr val="accent4"/>
+                    </a:solidFill>
+                  </a:tcPr>
+                </a:tc>
+                <a:tc hMerge="1">
+                  <a:txBody>
+                    <a:bodyPr/>
+                    <a:lstStyle/>
+                    <a:p>
+                      <a:endParaRPr lang="zh-CN" altLang="en-US" dirty="0"/>
+                    </a:p>
+                  </a:txBody>
+                  <a:tcPr/>
+                </a:tc>
+              </a:tr>
+              <a:tr h="253953">
+                <a:tc>
+                  <a:txBody>
+                    <a:bodyPr/>
+                    <a:lstStyle/>
+                    <a:p>
+                      <a:pPr algn="ctr"/>
+                      <a:r>
+                        <a:rPr lang="en-US" altLang="zh-CN" sz="1050" dirty="0" smtClean="0"/>
+                        <a:t>[[prototype]]</a:t>
+                      </a:r>
+                      <a:endParaRPr lang="zh-CN" altLang="en-US" sz="1050" dirty="0"/>
+                    </a:p>
+                  </a:txBody>
+                  <a:tcPr>
+                    <a:solidFill>
+                      <a:schemeClr val="bg1">
+                        <a:lumMod val="65000"/>
+                      </a:schemeClr>
+                    </a:solidFill>
+                  </a:tcPr>
+                </a:tc>
+                <a:tc>
+                  <a:txBody>
+                    <a:bodyPr/>
+                    <a:lstStyle/>
+                    <a:p>
+                      <a:pPr algn="ctr"/>
+                      <a:endParaRPr lang="zh-CN" altLang="en-US" sz="1050" dirty="0"/>
+                    </a:p>
+                  </a:txBody>
+                  <a:tcPr>
+                    <a:solidFill>
+                      <a:schemeClr val="bg1">
+                        <a:lumMod val="65000"/>
+                      </a:schemeClr>
+                    </a:solidFill>
+                  </a:tcPr>
+                </a:tc>
+              </a:tr>
+            </a:tbl>
+          </a:graphicData>
+        </a:graphic>
+      </p:graphicFrame>
+      <p:cxnSp>
+        <p:nvCxnSpPr>
+          <p:cNvPr id="55" name="Straight Connector 54"/>
+          <p:cNvCxnSpPr/>
+          <p:nvPr/>
+        </p:nvCxnSpPr>
+        <p:spPr>
+          <a:xfrm>
+            <a:off x="4319723" y="2996953"/>
+            <a:ext cx="1404405" cy="0"/>
+          </a:xfrm>
+          <a:prstGeom prst="line">
+            <a:avLst/>
+          </a:prstGeom>
+          <a:ln w="12700">
+            <a:prstDash val="solid"/>
+            <a:headEnd type="oval"/>
+          </a:ln>
+        </p:spPr>
+        <p:style>
+          <a:lnRef idx="1">
+            <a:schemeClr val="accent1"/>
+          </a:lnRef>
+          <a:fillRef idx="0">
+            <a:schemeClr val="accent1"/>
+          </a:fillRef>
+          <a:effectRef idx="0">
+            <a:schemeClr val="accent1"/>
+          </a:effectRef>
+          <a:fontRef idx="minor">
+            <a:schemeClr val="tx1"/>
+          </a:fontRef>
+        </p:style>
+      </p:cxnSp>
+      <p:cxnSp>
+        <p:nvCxnSpPr>
+          <p:cNvPr id="57" name="Elbow Connector 56"/>
+          <p:cNvCxnSpPr/>
+          <p:nvPr/>
+        </p:nvCxnSpPr>
+        <p:spPr>
+          <a:xfrm rot="16200000" flipH="1">
+            <a:off x="7195714" y="3597127"/>
+            <a:ext cx="1576862" cy="520532"/>
+          </a:xfrm>
+          <a:prstGeom prst="bentConnector3">
+            <a:avLst>
+              <a:gd name="adj1" fmla="val 50000"/>
+            </a:avLst>
+          </a:prstGeom>
+          <a:ln w="12700">
+            <a:round/>
+            <a:headEnd type="oval" w="med" len="med"/>
+            <a:tailEnd type="none" w="lg" len="lg"/>
+          </a:ln>
+        </p:spPr>
+        <p:style>
+          <a:lnRef idx="1">
+            <a:schemeClr val="accent1"/>
+          </a:lnRef>
+          <a:fillRef idx="0">
+            <a:schemeClr val="accent1"/>
+          </a:fillRef>
+          <a:effectRef idx="0">
+            <a:schemeClr val="accent1"/>
+          </a:effectRef>
+          <a:fontRef idx="minor">
+            <a:schemeClr val="tx1"/>
+          </a:fontRef>
+        </p:style>
+      </p:cxnSp>
+      <p:cxnSp>
+        <p:nvCxnSpPr>
+          <p:cNvPr id="61" name="Elbow Connector 60"/>
+          <p:cNvCxnSpPr/>
+          <p:nvPr/>
+        </p:nvCxnSpPr>
+        <p:spPr>
+          <a:xfrm rot="16200000" flipV="1">
+            <a:off x="7688691" y="1385828"/>
+            <a:ext cx="1464874" cy="654673"/>
+          </a:xfrm>
+          <a:prstGeom prst="bentConnector3">
+            <a:avLst>
+              <a:gd name="adj1" fmla="val 100612"/>
+            </a:avLst>
+          </a:prstGeom>
+          <a:ln w="12700">
+            <a:prstDash val="dash"/>
+            <a:headEnd type="none" w="lg" len="lg"/>
+            <a:tailEnd type="stealth" w="lg" len="lg"/>
+          </a:ln>
+        </p:spPr>
+        <p:style>
+          <a:lnRef idx="1">
+            <a:schemeClr val="accent1"/>
+          </a:lnRef>
+          <a:fillRef idx="0">
+            <a:schemeClr val="accent1"/>
+          </a:fillRef>
+          <a:effectRef idx="0">
+            <a:schemeClr val="accent1"/>
+          </a:effectRef>
+          <a:fontRef idx="minor">
+            <a:schemeClr val="tx1"/>
+          </a:fontRef>
+        </p:style>
+      </p:cxnSp>
+      <p:cxnSp>
+        <p:nvCxnSpPr>
+          <p:cNvPr id="64" name="Straight Connector 63"/>
+          <p:cNvCxnSpPr/>
+          <p:nvPr/>
+        </p:nvCxnSpPr>
+        <p:spPr>
+          <a:xfrm>
+            <a:off x="7992382" y="2445602"/>
+            <a:ext cx="756082" cy="0"/>
+          </a:xfrm>
+          <a:prstGeom prst="line">
+            <a:avLst/>
+          </a:prstGeom>
+          <a:ln w="12700">
+            <a:prstDash val="dash"/>
+            <a:headEnd type="oval"/>
+          </a:ln>
+        </p:spPr>
+        <p:style>
+          <a:lnRef idx="1">
+            <a:schemeClr val="accent1"/>
+          </a:lnRef>
+          <a:fillRef idx="0">
+            <a:schemeClr val="accent1"/>
+          </a:fillRef>
+          <a:effectRef idx="0">
+            <a:schemeClr val="accent1"/>
+          </a:effectRef>
+          <a:fontRef idx="minor">
+            <a:schemeClr val="tx1"/>
+          </a:fontRef>
+        </p:style>
+      </p:cxnSp>
     </p:spTree>
     <p:extLst>
       <p:ext uri="{BB962C8B-B14F-4D97-AF65-F5344CB8AC3E}">

</xml_diff>